<commit_message>
Finished the sending message section.
</commit_message>
<xml_diff>
--- a/diagrams master.pptx
+++ b/diagrams master.pptx
@@ -5,14 +5,15 @@
     <p:sldMasterId id="2147483720" r:id="rId1"/>
   </p:sldMasterIdLst>
   <p:notesMasterIdLst>
-    <p:notesMasterId r:id="rId7"/>
+    <p:notesMasterId r:id="rId8"/>
   </p:notesMasterIdLst>
   <p:sldIdLst>
     <p:sldId id="256" r:id="rId2"/>
     <p:sldId id="257" r:id="rId3"/>
-    <p:sldId id="260" r:id="rId4"/>
-    <p:sldId id="259" r:id="rId5"/>
-    <p:sldId id="258" r:id="rId6"/>
+    <p:sldId id="261" r:id="rId4"/>
+    <p:sldId id="260" r:id="rId5"/>
+    <p:sldId id="259" r:id="rId6"/>
+    <p:sldId id="258" r:id="rId7"/>
   </p:sldIdLst>
   <p:sldSz cx="27276425" cy="8010525"/>
   <p:notesSz cx="6858000" cy="9144000"/>
@@ -201,7 +202,7 @@
           <a:p>
             <a:fld id="{96D80CEC-3758-8843-8960-854EC3452E17}" type="datetimeFigureOut">
               <a:rPr lang="en-US" smtClean="0"/>
-              <a:t>7/27/20</a:t>
+              <a:t>7/29/20</a:t>
             </a:fld>
             <a:endParaRPr lang="en-US"/>
           </a:p>
@@ -637,7 +638,7 @@
     </p:spTree>
     <p:extLst>
       <p:ext uri="{BB962C8B-B14F-4D97-AF65-F5344CB8AC3E}">
-        <p14:creationId xmlns:p14="http://schemas.microsoft.com/office/powerpoint/2010/main" val="1841397797"/>
+        <p14:creationId xmlns:p14="http://schemas.microsoft.com/office/powerpoint/2010/main" val="3838837793"/>
       </p:ext>
     </p:extLst>
   </p:cSld>
@@ -726,7 +727,7 @@
     </p:spTree>
     <p:extLst>
       <p:ext uri="{BB962C8B-B14F-4D97-AF65-F5344CB8AC3E}">
-        <p14:creationId xmlns:p14="http://schemas.microsoft.com/office/powerpoint/2010/main" val="1915757282"/>
+        <p14:creationId xmlns:p14="http://schemas.microsoft.com/office/powerpoint/2010/main" val="1841397797"/>
       </p:ext>
     </p:extLst>
   </p:cSld>
@@ -807,6 +808,95 @@
             <a:fld id="{9CCFC0CB-3D1F-A24D-BC1E-C31F14B75499}" type="slidenum">
               <a:rPr lang="en-US" smtClean="0"/>
               <a:t>5</a:t>
+            </a:fld>
+            <a:endParaRPr lang="en-US"/>
+          </a:p>
+        </p:txBody>
+      </p:sp>
+    </p:spTree>
+    <p:extLst>
+      <p:ext uri="{BB962C8B-B14F-4D97-AF65-F5344CB8AC3E}">
+        <p14:creationId xmlns:p14="http://schemas.microsoft.com/office/powerpoint/2010/main" val="1915757282"/>
+      </p:ext>
+    </p:extLst>
+  </p:cSld>
+  <p:clrMapOvr>
+    <a:masterClrMapping/>
+  </p:clrMapOvr>
+</p:notes>
+</file>
+
+<file path=ppt/notesSlides/notesSlide5.xml><?xml version="1.0" encoding="utf-8"?>
+<p:notes xmlns:a="http://schemas.openxmlformats.org/drawingml/2006/main" xmlns:r="http://schemas.openxmlformats.org/officeDocument/2006/relationships" xmlns:p="http://schemas.openxmlformats.org/presentationml/2006/main">
+  <p:cSld>
+    <p:spTree>
+      <p:nvGrpSpPr>
+        <p:cNvPr id="1" name=""/>
+        <p:cNvGrpSpPr/>
+        <p:nvPr/>
+      </p:nvGrpSpPr>
+      <p:grpSpPr>
+        <a:xfrm>
+          <a:off x="0" y="0"/>
+          <a:ext cx="0" cy="0"/>
+          <a:chOff x="0" y="0"/>
+          <a:chExt cx="0" cy="0"/>
+        </a:xfrm>
+      </p:grpSpPr>
+      <p:sp>
+        <p:nvSpPr>
+          <p:cNvPr id="2" name="Slide Image Placeholder 1"/>
+          <p:cNvSpPr>
+            <a:spLocks noGrp="1" noRot="1" noChangeAspect="1"/>
+          </p:cNvSpPr>
+          <p:nvPr>
+            <p:ph type="sldImg"/>
+          </p:nvPr>
+        </p:nvSpPr>
+        <p:spPr>
+          <a:xfrm>
+            <a:off x="-1824038" y="1143000"/>
+            <a:ext cx="10506076" cy="3086100"/>
+          </a:xfrm>
+        </p:spPr>
+      </p:sp>
+      <p:sp>
+        <p:nvSpPr>
+          <p:cNvPr id="3" name="Notes Placeholder 2"/>
+          <p:cNvSpPr>
+            <a:spLocks noGrp="1"/>
+          </p:cNvSpPr>
+          <p:nvPr>
+            <p:ph type="body" idx="1"/>
+          </p:nvPr>
+        </p:nvSpPr>
+        <p:spPr/>
+        <p:txBody>
+          <a:bodyPr/>
+          <a:lstStyle/>
+          <a:p>
+            <a:endParaRPr lang="en-US" dirty="0"/>
+          </a:p>
+        </p:txBody>
+      </p:sp>
+      <p:sp>
+        <p:nvSpPr>
+          <p:cNvPr id="4" name="Slide Number Placeholder 3"/>
+          <p:cNvSpPr>
+            <a:spLocks noGrp="1"/>
+          </p:cNvSpPr>
+          <p:nvPr>
+            <p:ph type="sldNum" sz="quarter" idx="5"/>
+          </p:nvPr>
+        </p:nvSpPr>
+        <p:spPr/>
+        <p:txBody>
+          <a:bodyPr/>
+          <a:lstStyle/>
+          <a:p>
+            <a:fld id="{9CCFC0CB-3D1F-A24D-BC1E-C31F14B75499}" type="slidenum">
+              <a:rPr lang="en-US" smtClean="0"/>
+              <a:t>6</a:t>
             </a:fld>
             <a:endParaRPr lang="en-US"/>
           </a:p>
@@ -956,7 +1046,7 @@
           <a:p>
             <a:fld id="{62AD1A56-A244-7843-98F4-C7009D7559EA}" type="datetimeFigureOut">
               <a:rPr lang="en-US" smtClean="0"/>
-              <a:t>7/27/20</a:t>
+              <a:t>7/29/20</a:t>
             </a:fld>
             <a:endParaRPr lang="en-US"/>
           </a:p>
@@ -1126,7 +1216,7 @@
           <a:p>
             <a:fld id="{62AD1A56-A244-7843-98F4-C7009D7559EA}" type="datetimeFigureOut">
               <a:rPr lang="en-US" smtClean="0"/>
-              <a:t>7/27/20</a:t>
+              <a:t>7/29/20</a:t>
             </a:fld>
             <a:endParaRPr lang="en-US"/>
           </a:p>
@@ -1306,7 +1396,7 @@
           <a:p>
             <a:fld id="{62AD1A56-A244-7843-98F4-C7009D7559EA}" type="datetimeFigureOut">
               <a:rPr lang="en-US" smtClean="0"/>
-              <a:t>7/27/20</a:t>
+              <a:t>7/29/20</a:t>
             </a:fld>
             <a:endParaRPr lang="en-US"/>
           </a:p>
@@ -1476,7 +1566,7 @@
           <a:p>
             <a:fld id="{62AD1A56-A244-7843-98F4-C7009D7559EA}" type="datetimeFigureOut">
               <a:rPr lang="en-US" smtClean="0"/>
-              <a:t>7/27/20</a:t>
+              <a:t>7/29/20</a:t>
             </a:fld>
             <a:endParaRPr lang="en-US"/>
           </a:p>
@@ -1722,7 +1812,7 @@
           <a:p>
             <a:fld id="{62AD1A56-A244-7843-98F4-C7009D7559EA}" type="datetimeFigureOut">
               <a:rPr lang="en-US" smtClean="0"/>
-              <a:t>7/27/20</a:t>
+              <a:t>7/29/20</a:t>
             </a:fld>
             <a:endParaRPr lang="en-US"/>
           </a:p>
@@ -1954,7 +2044,7 @@
           <a:p>
             <a:fld id="{62AD1A56-A244-7843-98F4-C7009D7559EA}" type="datetimeFigureOut">
               <a:rPr lang="en-US" smtClean="0"/>
-              <a:t>7/27/20</a:t>
+              <a:t>7/29/20</a:t>
             </a:fld>
             <a:endParaRPr lang="en-US"/>
           </a:p>
@@ -2321,7 +2411,7 @@
           <a:p>
             <a:fld id="{62AD1A56-A244-7843-98F4-C7009D7559EA}" type="datetimeFigureOut">
               <a:rPr lang="en-US" smtClean="0"/>
-              <a:t>7/27/20</a:t>
+              <a:t>7/29/20</a:t>
             </a:fld>
             <a:endParaRPr lang="en-US"/>
           </a:p>
@@ -2439,7 +2529,7 @@
           <a:p>
             <a:fld id="{62AD1A56-A244-7843-98F4-C7009D7559EA}" type="datetimeFigureOut">
               <a:rPr lang="en-US" smtClean="0"/>
-              <a:t>7/27/20</a:t>
+              <a:t>7/29/20</a:t>
             </a:fld>
             <a:endParaRPr lang="en-US"/>
           </a:p>
@@ -2534,7 +2624,7 @@
           <a:p>
             <a:fld id="{62AD1A56-A244-7843-98F4-C7009D7559EA}" type="datetimeFigureOut">
               <a:rPr lang="en-US" smtClean="0"/>
-              <a:t>7/27/20</a:t>
+              <a:t>7/29/20</a:t>
             </a:fld>
             <a:endParaRPr lang="en-US"/>
           </a:p>
@@ -2811,7 +2901,7 @@
           <a:p>
             <a:fld id="{62AD1A56-A244-7843-98F4-C7009D7559EA}" type="datetimeFigureOut">
               <a:rPr lang="en-US" smtClean="0"/>
-              <a:t>7/27/20</a:t>
+              <a:t>7/29/20</a:t>
             </a:fld>
             <a:endParaRPr lang="en-US"/>
           </a:p>
@@ -3068,7 +3158,7 @@
           <a:p>
             <a:fld id="{62AD1A56-A244-7843-98F4-C7009D7559EA}" type="datetimeFigureOut">
               <a:rPr lang="en-US" smtClean="0"/>
-              <a:t>7/27/20</a:t>
+              <a:t>7/29/20</a:t>
             </a:fld>
             <a:endParaRPr lang="en-US"/>
           </a:p>
@@ -3281,7 +3371,7 @@
           <a:p>
             <a:fld id="{62AD1A56-A244-7843-98F4-C7009D7559EA}" type="datetimeFigureOut">
               <a:rPr lang="en-US" smtClean="0"/>
-              <a:t>7/27/20</a:t>
+              <a:t>7/29/20</a:t>
             </a:fld>
             <a:endParaRPr lang="en-US"/>
           </a:p>
@@ -13451,10 +13541,253 @@
       </p:grpSpPr>
       <p:sp>
         <p:nvSpPr>
-          <p:cNvPr id="335" name="U-turn Arrow 334">
-            <a:extLst>
-              <a:ext uri="{FF2B5EF4-FFF2-40B4-BE49-F238E27FC236}">
-                <a16:creationId xmlns:a16="http://schemas.microsoft.com/office/drawing/2014/main" id="{EB324753-8FF7-094D-968D-570D5BF72370}"/>
+          <p:cNvPr id="282" name="TextBox 281">
+            <a:extLst>
+              <a:ext uri="{FF2B5EF4-FFF2-40B4-BE49-F238E27FC236}">
+                <a16:creationId xmlns:a16="http://schemas.microsoft.com/office/drawing/2014/main" id="{678AC224-495C-5C43-868C-3BA2B399D618}"/>
+              </a:ext>
+            </a:extLst>
+          </p:cNvPr>
+          <p:cNvSpPr txBox="1"/>
+          <p:nvPr/>
+        </p:nvSpPr>
+        <p:spPr>
+          <a:xfrm>
+            <a:off x="13272863" y="1859954"/>
+            <a:ext cx="2431289" cy="1200329"/>
+          </a:xfrm>
+          <a:prstGeom prst="rect">
+            <a:avLst/>
+          </a:prstGeom>
+          <a:noFill/>
+        </p:spPr>
+        <p:txBody>
+          <a:bodyPr wrap="square" rtlCol="0">
+            <a:spAutoFit/>
+          </a:bodyPr>
+          <a:lstStyle/>
+          <a:p>
+            <a:pPr algn="ctr"/>
+            <a:r>
+              <a:rPr lang="en-US" sz="1200" b="1" dirty="0"/>
+              <a:t>FlowStateMachineImpl</a:t>
+            </a:r>
+          </a:p>
+          <a:p>
+            <a:pPr algn="ctr"/>
+            <a:endParaRPr lang="en-US" sz="1200" b="1" dirty="0"/>
+          </a:p>
+          <a:p>
+            <a:r>
+              <a:rPr lang="en-US" sz="1200" dirty="0"/>
+              <a:t>suspend()</a:t>
+            </a:r>
+          </a:p>
+          <a:p>
+            <a:r>
+              <a:rPr lang="en-US" sz="1200" dirty="0"/>
+              <a:t>scheduleEvent()</a:t>
+            </a:r>
+          </a:p>
+          <a:p>
+            <a:r>
+              <a:rPr lang="en-US" sz="1200" dirty="0"/>
+              <a:t>processEventsUntilFlowIsResumed()</a:t>
+            </a:r>
+          </a:p>
+          <a:p>
+            <a:r>
+              <a:rPr lang="en-US" sz="1200" dirty="0"/>
+              <a:t>processEvent()</a:t>
+            </a:r>
+          </a:p>
+        </p:txBody>
+      </p:sp>
+      <p:sp>
+        <p:nvSpPr>
+          <p:cNvPr id="396" name="TextBox 395">
+            <a:extLst>
+              <a:ext uri="{FF2B5EF4-FFF2-40B4-BE49-F238E27FC236}">
+                <a16:creationId xmlns:a16="http://schemas.microsoft.com/office/drawing/2014/main" id="{3895B6B1-C884-BB42-85E5-3D15C82D744A}"/>
+              </a:ext>
+            </a:extLst>
+          </p:cNvPr>
+          <p:cNvSpPr txBox="1"/>
+          <p:nvPr/>
+        </p:nvSpPr>
+        <p:spPr>
+          <a:xfrm>
+            <a:off x="14007829" y="3838297"/>
+            <a:ext cx="1411161" cy="461665"/>
+          </a:xfrm>
+          <a:prstGeom prst="rect">
+            <a:avLst/>
+          </a:prstGeom>
+          <a:noFill/>
+          <a:ln w="6350">
+            <a:solidFill>
+              <a:schemeClr val="tx1"/>
+            </a:solidFill>
+          </a:ln>
+        </p:spPr>
+        <p:txBody>
+          <a:bodyPr wrap="square" rtlCol="0">
+            <a:spAutoFit/>
+          </a:bodyPr>
+          <a:lstStyle/>
+          <a:p>
+            <a:pPr algn="ctr"/>
+            <a:r>
+              <a:rPr lang="en-US" sz="1200" dirty="0"/>
+              <a:t>&lt;&lt;interface&gt;&gt;</a:t>
+            </a:r>
+          </a:p>
+          <a:p>
+            <a:pPr algn="ctr"/>
+            <a:r>
+              <a:rPr lang="en-US" sz="1200" b="1" dirty="0"/>
+              <a:t>TransitionExecutor</a:t>
+            </a:r>
+          </a:p>
+        </p:txBody>
+      </p:sp>
+      <p:sp>
+        <p:nvSpPr>
+          <p:cNvPr id="213" name="TextBox 212">
+            <a:extLst>
+              <a:ext uri="{FF2B5EF4-FFF2-40B4-BE49-F238E27FC236}">
+                <a16:creationId xmlns:a16="http://schemas.microsoft.com/office/drawing/2014/main" id="{06BAF60D-B1E1-CE4C-8CEC-37038C8859DA}"/>
+              </a:ext>
+            </a:extLst>
+          </p:cNvPr>
+          <p:cNvSpPr txBox="1"/>
+          <p:nvPr/>
+        </p:nvSpPr>
+        <p:spPr>
+          <a:xfrm>
+            <a:off x="10573639" y="1530937"/>
+            <a:ext cx="1820044" cy="1754326"/>
+          </a:xfrm>
+          <a:prstGeom prst="rect">
+            <a:avLst/>
+          </a:prstGeom>
+          <a:noFill/>
+          <a:ln w="6350">
+            <a:solidFill>
+              <a:schemeClr val="tx1"/>
+            </a:solidFill>
+          </a:ln>
+        </p:spPr>
+        <p:txBody>
+          <a:bodyPr wrap="square" rtlCol="0">
+            <a:spAutoFit/>
+          </a:bodyPr>
+          <a:lstStyle/>
+          <a:p>
+            <a:pPr algn="ctr"/>
+            <a:r>
+              <a:rPr lang="en-US" sz="1200" b="1" dirty="0"/>
+              <a:t>ActionExecutorImpl</a:t>
+            </a:r>
+          </a:p>
+          <a:p>
+            <a:pPr algn="ctr"/>
+            <a:endParaRPr lang="en-US" sz="1200" b="1" dirty="0"/>
+          </a:p>
+          <a:p>
+            <a:r>
+              <a:rPr lang="en-US" sz="1200" dirty="0"/>
+              <a:t>flowMessaging</a:t>
+            </a:r>
+          </a:p>
+          <a:p>
+            <a:r>
+              <a:rPr lang="en-US" sz="1200" dirty="0"/>
+              <a:t>executeScheduleEvent()</a:t>
+            </a:r>
+          </a:p>
+          <a:p>
+            <a:r>
+              <a:rPr lang="en-GB" sz="1200" dirty="0"/>
+              <a:t>executePropagateErrors()</a:t>
+            </a:r>
+          </a:p>
+          <a:p>
+            <a:r>
+              <a:rPr lang="en-GB" sz="1200" dirty="0"/>
+              <a:t>executeSendItitial()</a:t>
+            </a:r>
+          </a:p>
+          <a:p>
+            <a:r>
+              <a:rPr lang="en-GB" sz="1200" dirty="0"/>
+              <a:t>executeSendExisting()</a:t>
+            </a:r>
+          </a:p>
+          <a:p>
+            <a:r>
+              <a:rPr lang="en-GB" sz="1200" dirty="0"/>
+              <a:t>executeSendMultiple()</a:t>
+            </a:r>
+          </a:p>
+          <a:p>
+            <a:r>
+              <a:rPr lang="en-GB" sz="1200" dirty="0"/>
+              <a:t>executeAction()</a:t>
+            </a:r>
+            <a:endParaRPr lang="en-US" sz="1200" dirty="0"/>
+          </a:p>
+        </p:txBody>
+      </p:sp>
+      <p:sp>
+        <p:nvSpPr>
+          <p:cNvPr id="44" name="TextBox 43">
+            <a:extLst>
+              <a:ext uri="{FF2B5EF4-FFF2-40B4-BE49-F238E27FC236}">
+                <a16:creationId xmlns:a16="http://schemas.microsoft.com/office/drawing/2014/main" id="{EBD0891B-A639-AD49-93E1-4DBD8AB6376B}"/>
+              </a:ext>
+            </a:extLst>
+          </p:cNvPr>
+          <p:cNvSpPr txBox="1"/>
+          <p:nvPr/>
+        </p:nvSpPr>
+        <p:spPr>
+          <a:xfrm>
+            <a:off x="6433095" y="1931276"/>
+            <a:ext cx="1335126" cy="461665"/>
+          </a:xfrm>
+          <a:prstGeom prst="rect">
+            <a:avLst/>
+          </a:prstGeom>
+          <a:noFill/>
+        </p:spPr>
+        <p:txBody>
+          <a:bodyPr wrap="square" rtlCol="0">
+            <a:spAutoFit/>
+          </a:bodyPr>
+          <a:lstStyle/>
+          <a:p>
+            <a:pPr algn="ctr"/>
+            <a:r>
+              <a:rPr lang="en-US" sz="1200" dirty="0"/>
+              <a:t>&lt;&lt;interface&gt;&gt;</a:t>
+            </a:r>
+          </a:p>
+          <a:p>
+            <a:pPr algn="ctr"/>
+            <a:r>
+              <a:rPr lang="en-US" sz="1200" b="1" dirty="0"/>
+              <a:t>MessagingService</a:t>
+            </a:r>
+          </a:p>
+        </p:txBody>
+      </p:sp>
+      <p:sp>
+        <p:nvSpPr>
+          <p:cNvPr id="45" name="Rectangle 44">
+            <a:extLst>
+              <a:ext uri="{FF2B5EF4-FFF2-40B4-BE49-F238E27FC236}">
+                <a16:creationId xmlns:a16="http://schemas.microsoft.com/office/drawing/2014/main" id="{17A1CC86-B35B-1348-A311-30C87DFF347B}"/>
               </a:ext>
             </a:extLst>
           </p:cNvPr>
@@ -13462,25 +13795,17 @@
           <p:nvPr/>
         </p:nvSpPr>
         <p:spPr>
-          <a:xfrm rot="16200000" flipH="1">
-            <a:off x="13175439" y="2158766"/>
-            <a:ext cx="395800" cy="767522"/>
-          </a:xfrm>
-          <a:prstGeom prst="uturnArrow">
-            <a:avLst>
-              <a:gd name="adj1" fmla="val 0"/>
-              <a:gd name="adj2" fmla="val 4765"/>
-              <a:gd name="adj3" fmla="val 8630"/>
-              <a:gd name="adj4" fmla="val 0"/>
-              <a:gd name="adj5" fmla="val 100000"/>
-            </a:avLst>
-          </a:prstGeom>
-          <a:solidFill>
-            <a:srgbClr val="FF0000"/>
-          </a:solidFill>
-          <a:ln w="28575">
-            <a:solidFill>
-              <a:srgbClr val="FF0000"/>
+          <a:xfrm>
+            <a:off x="6285991" y="2764022"/>
+            <a:ext cx="1611435" cy="1744924"/>
+          </a:xfrm>
+          <a:prstGeom prst="rect">
+            <a:avLst/>
+          </a:prstGeom>
+          <a:noFill/>
+          <a:ln>
+            <a:solidFill>
+              <a:schemeClr val="tx1"/>
             </a:solidFill>
           </a:ln>
         </p:spPr>
@@ -13505,20 +13830,16 @@
           <a:lstStyle/>
           <a:p>
             <a:pPr algn="ctr"/>
-            <a:endParaRPr lang="en-US">
-              <a:solidFill>
-                <a:schemeClr val="tx1"/>
-              </a:solidFill>
-            </a:endParaRPr>
-          </a:p>
-        </p:txBody>
-      </p:sp>
-      <p:sp>
-        <p:nvSpPr>
-          <p:cNvPr id="282" name="TextBox 281">
-            <a:extLst>
-              <a:ext uri="{FF2B5EF4-FFF2-40B4-BE49-F238E27FC236}">
-                <a16:creationId xmlns:a16="http://schemas.microsoft.com/office/drawing/2014/main" id="{678AC224-495C-5C43-868C-3BA2B399D618}"/>
+            <a:endParaRPr lang="en-US"/>
+          </a:p>
+        </p:txBody>
+      </p:sp>
+      <p:sp>
+        <p:nvSpPr>
+          <p:cNvPr id="46" name="TextBox 45">
+            <a:extLst>
+              <a:ext uri="{FF2B5EF4-FFF2-40B4-BE49-F238E27FC236}">
+                <a16:creationId xmlns:a16="http://schemas.microsoft.com/office/drawing/2014/main" id="{96650001-8C7C-2E45-9761-571B33EDFE4B}"/>
               </a:ext>
             </a:extLst>
           </p:cNvPr>
@@ -13527,8 +13848,8 @@
         </p:nvSpPr>
         <p:spPr>
           <a:xfrm>
-            <a:off x="13798312" y="1860020"/>
-            <a:ext cx="2431289" cy="1200329"/>
+            <a:off x="6280572" y="2754621"/>
+            <a:ext cx="1607433" cy="1754326"/>
           </a:xfrm>
           <a:prstGeom prst="rect">
             <a:avLst/>
@@ -13544,7 +13865,7 @@
             <a:pPr algn="ctr"/>
             <a:r>
               <a:rPr lang="en-US" sz="1200" b="1" dirty="0"/>
-              <a:t>FlowStateMachineImpl</a:t>
+              <a:t>P2PMessagingClient</a:t>
             </a:r>
           </a:p>
           <a:p>
@@ -13554,35 +13875,304 @@
           <a:p>
             <a:r>
               <a:rPr lang="en-US" sz="1200" dirty="0"/>
-              <a:t>suspend()</a:t>
+              <a:t>messagingExecutor</a:t>
             </a:r>
           </a:p>
           <a:p>
             <a:r>
               <a:rPr lang="en-US" sz="1200" dirty="0"/>
-              <a:t>scheduleEvent()</a:t>
-            </a:r>
+              <a:t>p2pConsumer</a:t>
+            </a:r>
+          </a:p>
+          <a:p>
+            <a:endParaRPr lang="en-US" sz="1200" dirty="0"/>
           </a:p>
           <a:p>
             <a:r>
               <a:rPr lang="en-US" sz="1200" dirty="0"/>
-              <a:t>processEventsUntilFlowIsResumed()</a:t>
+              <a:t>send()</a:t>
             </a:r>
           </a:p>
           <a:p>
             <a:r>
               <a:rPr lang="en-US" sz="1200" dirty="0"/>
-              <a:t>processEvent()</a:t>
-            </a:r>
-          </a:p>
-        </p:txBody>
-      </p:sp>
-      <p:sp>
-        <p:nvSpPr>
-          <p:cNvPr id="281" name="Rectangle 280">
-            <a:extLst>
-              <a:ext uri="{FF2B5EF4-FFF2-40B4-BE49-F238E27FC236}">
-                <a16:creationId xmlns:a16="http://schemas.microsoft.com/office/drawing/2014/main" id="{B0B8E156-8950-4A49-970A-34E12F2DAC6E}"/>
+              <a:t>addMessageHandler()</a:t>
+            </a:r>
+          </a:p>
+          <a:p>
+            <a:r>
+              <a:rPr lang="en-US" sz="1200" dirty="0"/>
+              <a:t>deliver()</a:t>
+            </a:r>
+          </a:p>
+          <a:p>
+            <a:r>
+              <a:rPr lang="en-US" sz="1200" dirty="0"/>
+              <a:t>start()</a:t>
+            </a:r>
+          </a:p>
+        </p:txBody>
+      </p:sp>
+      <p:sp>
+        <p:nvSpPr>
+          <p:cNvPr id="49" name="TextBox 48">
+            <a:extLst>
+              <a:ext uri="{FF2B5EF4-FFF2-40B4-BE49-F238E27FC236}">
+                <a16:creationId xmlns:a16="http://schemas.microsoft.com/office/drawing/2014/main" id="{E6DB0753-1780-9D4A-AFFB-C65A8E3EEDA2}"/>
+              </a:ext>
+            </a:extLst>
+          </p:cNvPr>
+          <p:cNvSpPr txBox="1"/>
+          <p:nvPr/>
+        </p:nvSpPr>
+        <p:spPr>
+          <a:xfrm>
+            <a:off x="8304174" y="1958179"/>
+            <a:ext cx="1370087" cy="461665"/>
+          </a:xfrm>
+          <a:prstGeom prst="rect">
+            <a:avLst/>
+          </a:prstGeom>
+          <a:noFill/>
+          <a:ln w="6350">
+            <a:solidFill>
+              <a:schemeClr val="tx1"/>
+            </a:solidFill>
+          </a:ln>
+        </p:spPr>
+        <p:txBody>
+          <a:bodyPr wrap="square" rtlCol="0">
+            <a:spAutoFit/>
+          </a:bodyPr>
+          <a:lstStyle/>
+          <a:p>
+            <a:pPr algn="ctr"/>
+            <a:r>
+              <a:rPr lang="en-US" sz="1200" dirty="0"/>
+              <a:t>&lt;&lt;interface&gt;&gt;</a:t>
+            </a:r>
+          </a:p>
+          <a:p>
+            <a:pPr algn="ctr"/>
+            <a:r>
+              <a:rPr lang="en-US" sz="1200" b="1" dirty="0"/>
+              <a:t>FlowMessaging</a:t>
+            </a:r>
+          </a:p>
+        </p:txBody>
+      </p:sp>
+      <p:sp>
+        <p:nvSpPr>
+          <p:cNvPr id="51" name="TextBox 50">
+            <a:extLst>
+              <a:ext uri="{FF2B5EF4-FFF2-40B4-BE49-F238E27FC236}">
+                <a16:creationId xmlns:a16="http://schemas.microsoft.com/office/drawing/2014/main" id="{CD3A29FB-6824-D74E-8572-DD13CDC52829}"/>
+              </a:ext>
+            </a:extLst>
+          </p:cNvPr>
+          <p:cNvSpPr txBox="1"/>
+          <p:nvPr/>
+        </p:nvSpPr>
+        <p:spPr>
+          <a:xfrm>
+            <a:off x="8192771" y="2810832"/>
+            <a:ext cx="1611435" cy="830997"/>
+          </a:xfrm>
+          <a:prstGeom prst="rect">
+            <a:avLst/>
+          </a:prstGeom>
+          <a:noFill/>
+          <a:ln w="6350">
+            <a:solidFill>
+              <a:schemeClr val="tx1"/>
+            </a:solidFill>
+          </a:ln>
+        </p:spPr>
+        <p:txBody>
+          <a:bodyPr wrap="square" rtlCol="0">
+            <a:spAutoFit/>
+          </a:bodyPr>
+          <a:lstStyle/>
+          <a:p>
+            <a:pPr algn="ctr"/>
+            <a:r>
+              <a:rPr lang="en-US" sz="1200" b="1" dirty="0"/>
+              <a:t>FlowMessagingImpl</a:t>
+            </a:r>
+          </a:p>
+          <a:p>
+            <a:pPr algn="ctr"/>
+            <a:endParaRPr lang="en-US" sz="1200" b="1" dirty="0"/>
+          </a:p>
+          <a:p>
+            <a:r>
+              <a:rPr lang="en-US" sz="1200" dirty="0"/>
+              <a:t>sendSessionMessage()</a:t>
+            </a:r>
+          </a:p>
+          <a:p>
+            <a:r>
+              <a:rPr lang="en-US" sz="1200" dirty="0"/>
+              <a:t>start()</a:t>
+            </a:r>
+          </a:p>
+        </p:txBody>
+      </p:sp>
+      <p:sp>
+        <p:nvSpPr>
+          <p:cNvPr id="59" name="TextBox 58">
+            <a:extLst>
+              <a:ext uri="{FF2B5EF4-FFF2-40B4-BE49-F238E27FC236}">
+                <a16:creationId xmlns:a16="http://schemas.microsoft.com/office/drawing/2014/main" id="{3C9F2867-7239-794B-BC8C-57368923051B}"/>
+              </a:ext>
+            </a:extLst>
+          </p:cNvPr>
+          <p:cNvSpPr txBox="1"/>
+          <p:nvPr/>
+        </p:nvSpPr>
+        <p:spPr>
+          <a:xfrm>
+            <a:off x="4140845" y="3010551"/>
+            <a:ext cx="1422193" cy="830997"/>
+          </a:xfrm>
+          <a:prstGeom prst="rect">
+            <a:avLst/>
+          </a:prstGeom>
+          <a:noFill/>
+          <a:ln w="6350">
+            <a:solidFill>
+              <a:schemeClr val="tx1"/>
+            </a:solidFill>
+          </a:ln>
+        </p:spPr>
+        <p:txBody>
+          <a:bodyPr wrap="square" rtlCol="0">
+            <a:spAutoFit/>
+          </a:bodyPr>
+          <a:lstStyle/>
+          <a:p>
+            <a:pPr algn="ctr"/>
+            <a:r>
+              <a:rPr lang="en-US" sz="1200" b="1" dirty="0"/>
+              <a:t>MessagingExecutor</a:t>
+            </a:r>
+          </a:p>
+          <a:p>
+            <a:pPr algn="ctr"/>
+            <a:endParaRPr lang="en-US" sz="1200" b="1" dirty="0"/>
+          </a:p>
+          <a:p>
+            <a:r>
+              <a:rPr lang="en-US" sz="1200" dirty="0"/>
+              <a:t>send()</a:t>
+            </a:r>
+          </a:p>
+          <a:p>
+            <a:r>
+              <a:rPr lang="en-US" sz="1200" dirty="0"/>
+              <a:t>Acknowledge()</a:t>
+            </a:r>
+          </a:p>
+        </p:txBody>
+      </p:sp>
+      <p:cxnSp>
+        <p:nvCxnSpPr>
+          <p:cNvPr id="60" name="Straight Arrow Connector 59">
+            <a:extLst>
+              <a:ext uri="{FF2B5EF4-FFF2-40B4-BE49-F238E27FC236}">
+                <a16:creationId xmlns:a16="http://schemas.microsoft.com/office/drawing/2014/main" id="{D4E155C4-3E65-F545-B29E-852BD95A9C1F}"/>
+              </a:ext>
+            </a:extLst>
+          </p:cNvPr>
+          <p:cNvCxnSpPr>
+            <a:cxnSpLocks/>
+            <a:stCxn id="46" idx="0"/>
+            <a:endCxn id="44" idx="2"/>
+          </p:cNvCxnSpPr>
+          <p:nvPr/>
+        </p:nvCxnSpPr>
+        <p:spPr>
+          <a:xfrm flipV="1">
+            <a:off x="7084289" y="2392941"/>
+            <a:ext cx="16369" cy="361680"/>
+          </a:xfrm>
+          <a:prstGeom prst="straightConnector1">
+            <a:avLst/>
+          </a:prstGeom>
+          <a:ln>
+            <a:solidFill>
+              <a:schemeClr val="tx1"/>
+            </a:solidFill>
+            <a:prstDash val="sysDash"/>
+            <a:headEnd type="none" w="med" len="med"/>
+            <a:tailEnd type="none" w="med" len="med"/>
+          </a:ln>
+        </p:spPr>
+        <p:style>
+          <a:lnRef idx="1">
+            <a:schemeClr val="accent1"/>
+          </a:lnRef>
+          <a:fillRef idx="0">
+            <a:schemeClr val="accent1"/>
+          </a:fillRef>
+          <a:effectRef idx="0">
+            <a:schemeClr val="accent1"/>
+          </a:effectRef>
+          <a:fontRef idx="minor">
+            <a:schemeClr val="tx1"/>
+          </a:fontRef>
+        </p:style>
+      </p:cxnSp>
+      <p:cxnSp>
+        <p:nvCxnSpPr>
+          <p:cNvPr id="65" name="Straight Arrow Connector 64">
+            <a:extLst>
+              <a:ext uri="{FF2B5EF4-FFF2-40B4-BE49-F238E27FC236}">
+                <a16:creationId xmlns:a16="http://schemas.microsoft.com/office/drawing/2014/main" id="{37C983F6-F0BC-9A40-A0F6-476D71B8B787}"/>
+              </a:ext>
+            </a:extLst>
+          </p:cNvPr>
+          <p:cNvCxnSpPr>
+            <a:cxnSpLocks/>
+          </p:cNvCxnSpPr>
+          <p:nvPr/>
+        </p:nvCxnSpPr>
+        <p:spPr>
+          <a:xfrm flipH="1" flipV="1">
+            <a:off x="4631473" y="3544750"/>
+            <a:ext cx="1700251" cy="285962"/>
+          </a:xfrm>
+          <a:prstGeom prst="straightConnector1">
+            <a:avLst/>
+          </a:prstGeom>
+          <a:ln w="28575">
+            <a:solidFill>
+              <a:srgbClr val="FF0000"/>
+            </a:solidFill>
+            <a:tailEnd type="triangle"/>
+          </a:ln>
+        </p:spPr>
+        <p:style>
+          <a:lnRef idx="1">
+            <a:schemeClr val="accent1"/>
+          </a:lnRef>
+          <a:fillRef idx="0">
+            <a:schemeClr val="accent1"/>
+          </a:fillRef>
+          <a:effectRef idx="0">
+            <a:schemeClr val="accent1"/>
+          </a:effectRef>
+          <a:fontRef idx="minor">
+            <a:schemeClr val="tx1"/>
+          </a:fontRef>
+        </p:style>
+      </p:cxnSp>
+      <p:sp>
+        <p:nvSpPr>
+          <p:cNvPr id="94" name="Rectangle 93">
+            <a:extLst>
+              <a:ext uri="{FF2B5EF4-FFF2-40B4-BE49-F238E27FC236}">
+                <a16:creationId xmlns:a16="http://schemas.microsoft.com/office/drawing/2014/main" id="{96D89DC2-CEF1-E54C-A2CC-5C35493A33B5}"/>
               </a:ext>
             </a:extLst>
           </p:cNvPr>
@@ -13591,16 +14181,20 @@
         </p:nvSpPr>
         <p:spPr>
           <a:xfrm>
-            <a:off x="13802974" y="1850199"/>
-            <a:ext cx="2426629" cy="1182852"/>
+            <a:off x="1507078" y="2445298"/>
+            <a:ext cx="1912883" cy="1430492"/>
           </a:xfrm>
           <a:prstGeom prst="rect">
             <a:avLst/>
           </a:prstGeom>
-          <a:noFill/>
-          <a:ln>
-            <a:solidFill>
-              <a:schemeClr val="tx1"/>
+          <a:solidFill>
+            <a:srgbClr val="FFCAC5">
+              <a:alpha val="43922"/>
+            </a:srgbClr>
+          </a:solidFill>
+          <a:ln w="28575">
+            <a:solidFill>
+              <a:srgbClr val="C00000"/>
             </a:solidFill>
           </a:ln>
         </p:spPr>
@@ -13631,10 +14225,45 @@
       </p:sp>
       <p:sp>
         <p:nvSpPr>
-          <p:cNvPr id="283" name="Rectangle 282">
-            <a:extLst>
-              <a:ext uri="{FF2B5EF4-FFF2-40B4-BE49-F238E27FC236}">
-                <a16:creationId xmlns:a16="http://schemas.microsoft.com/office/drawing/2014/main" id="{ECD92F49-DA58-D246-9003-ADF945763F15}"/>
+          <p:cNvPr id="95" name="TextBox 94">
+            <a:extLst>
+              <a:ext uri="{FF2B5EF4-FFF2-40B4-BE49-F238E27FC236}">
+                <a16:creationId xmlns:a16="http://schemas.microsoft.com/office/drawing/2014/main" id="{572D511E-CB1A-2247-84EA-8291835CBBE3}"/>
+              </a:ext>
+            </a:extLst>
+          </p:cNvPr>
+          <p:cNvSpPr txBox="1"/>
+          <p:nvPr/>
+        </p:nvSpPr>
+        <p:spPr>
+          <a:xfrm>
+            <a:off x="1788698" y="2502006"/>
+            <a:ext cx="1321452" cy="276999"/>
+          </a:xfrm>
+          <a:prstGeom prst="rect">
+            <a:avLst/>
+          </a:prstGeom>
+          <a:noFill/>
+        </p:spPr>
+        <p:txBody>
+          <a:bodyPr wrap="square" rtlCol="0">
+            <a:spAutoFit/>
+          </a:bodyPr>
+          <a:lstStyle/>
+          <a:p>
+            <a:r>
+              <a:rPr lang="en-US" sz="1200" b="1" dirty="0"/>
+              <a:t>ARTEMIS BROKER</a:t>
+            </a:r>
+          </a:p>
+        </p:txBody>
+      </p:sp>
+      <p:sp>
+        <p:nvSpPr>
+          <p:cNvPr id="96" name="Rectangle 95">
+            <a:extLst>
+              <a:ext uri="{FF2B5EF4-FFF2-40B4-BE49-F238E27FC236}">
+                <a16:creationId xmlns:a16="http://schemas.microsoft.com/office/drawing/2014/main" id="{C57FBE7C-D877-EB4B-B1E6-B54FD04B0922}"/>
               </a:ext>
             </a:extLst>
           </p:cNvPr>
@@ -13643,8 +14272,8 @@
         </p:nvSpPr>
         <p:spPr>
           <a:xfrm>
-            <a:off x="13133205" y="631070"/>
-            <a:ext cx="575895" cy="461665"/>
+            <a:off x="1643870" y="3352694"/>
+            <a:ext cx="1611434" cy="388120"/>
           </a:xfrm>
           <a:prstGeom prst="rect">
             <a:avLst/>
@@ -13683,10 +14312,10 @@
       </p:sp>
       <p:sp>
         <p:nvSpPr>
-          <p:cNvPr id="284" name="TextBox 283">
-            <a:extLst>
-              <a:ext uri="{FF2B5EF4-FFF2-40B4-BE49-F238E27FC236}">
-                <a16:creationId xmlns:a16="http://schemas.microsoft.com/office/drawing/2014/main" id="{944D5A21-76C1-4243-A4DA-7B175EFB05FE}"/>
+          <p:cNvPr id="97" name="TextBox 96">
+            <a:extLst>
+              <a:ext uri="{FF2B5EF4-FFF2-40B4-BE49-F238E27FC236}">
+                <a16:creationId xmlns:a16="http://schemas.microsoft.com/office/drawing/2014/main" id="{AC9996B4-E2DC-D94D-91EE-7108C9F7DAC6}"/>
               </a:ext>
             </a:extLst>
           </p:cNvPr>
@@ -13695,8 +14324,8 @@
         </p:nvSpPr>
         <p:spPr>
           <a:xfrm>
-            <a:off x="13133205" y="723402"/>
-            <a:ext cx="575895" cy="276999"/>
+            <a:off x="1643870" y="3409405"/>
+            <a:ext cx="1611434" cy="276999"/>
           </a:xfrm>
           <a:prstGeom prst="rect">
             <a:avLst/>
@@ -13712,17 +14341,17 @@
             <a:pPr algn="ctr"/>
             <a:r>
               <a:rPr lang="en-US" sz="1200" b="1" dirty="0"/>
-              <a:t>Fiber</a:t>
-            </a:r>
-          </a:p>
-        </p:txBody>
-      </p:sp>
-      <p:sp>
-        <p:nvSpPr>
-          <p:cNvPr id="285" name="Rectangle 284">
-            <a:extLst>
-              <a:ext uri="{FF2B5EF4-FFF2-40B4-BE49-F238E27FC236}">
-                <a16:creationId xmlns:a16="http://schemas.microsoft.com/office/drawing/2014/main" id="{540FE9E5-48C2-734B-A408-26FE12A96188}"/>
+              <a:t>p2p.inbound.____</a:t>
+            </a:r>
+          </a:p>
+        </p:txBody>
+      </p:sp>
+      <p:sp>
+        <p:nvSpPr>
+          <p:cNvPr id="98" name="Rectangle 97">
+            <a:extLst>
+              <a:ext uri="{FF2B5EF4-FFF2-40B4-BE49-F238E27FC236}">
+                <a16:creationId xmlns:a16="http://schemas.microsoft.com/office/drawing/2014/main" id="{3D1A08F5-D353-4B46-8FD8-A5181ACBB85F}"/>
               </a:ext>
             </a:extLst>
           </p:cNvPr>
@@ -13731,8 +14360,8 @@
         </p:nvSpPr>
         <p:spPr>
           <a:xfrm>
-            <a:off x="13900985" y="631070"/>
-            <a:ext cx="1725643" cy="461665"/>
+            <a:off x="1645904" y="2835703"/>
+            <a:ext cx="1611434" cy="388120"/>
           </a:xfrm>
           <a:prstGeom prst="rect">
             <a:avLst/>
@@ -13771,10 +14400,10 @@
       </p:sp>
       <p:sp>
         <p:nvSpPr>
-          <p:cNvPr id="286" name="TextBox 285">
-            <a:extLst>
-              <a:ext uri="{FF2B5EF4-FFF2-40B4-BE49-F238E27FC236}">
-                <a16:creationId xmlns:a16="http://schemas.microsoft.com/office/drawing/2014/main" id="{A5DB5365-C15B-B145-9E40-453F24251374}"/>
+          <p:cNvPr id="99" name="TextBox 98">
+            <a:extLst>
+              <a:ext uri="{FF2B5EF4-FFF2-40B4-BE49-F238E27FC236}">
+                <a16:creationId xmlns:a16="http://schemas.microsoft.com/office/drawing/2014/main" id="{41199066-6720-C149-8A29-A1D7C3A6325C}"/>
               </a:ext>
             </a:extLst>
           </p:cNvPr>
@@ -13783,8 +14412,8 @@
         </p:nvSpPr>
         <p:spPr>
           <a:xfrm>
-            <a:off x="13900981" y="631070"/>
-            <a:ext cx="1725642" cy="461665"/>
+            <a:off x="1645904" y="2903214"/>
+            <a:ext cx="1611434" cy="276999"/>
           </a:xfrm>
           <a:prstGeom prst="rect">
             <a:avLst/>
@@ -13799,6 +14428,131 @@
           <a:p>
             <a:pPr algn="ctr"/>
             <a:r>
+              <a:rPr lang="en-US" sz="1200" b="1" dirty="0"/>
+              <a:t>Internal.peers.____</a:t>
+            </a:r>
+          </a:p>
+        </p:txBody>
+      </p:sp>
+      <p:sp>
+        <p:nvSpPr>
+          <p:cNvPr id="100" name="TextBox 99">
+            <a:extLst>
+              <a:ext uri="{FF2B5EF4-FFF2-40B4-BE49-F238E27FC236}">
+                <a16:creationId xmlns:a16="http://schemas.microsoft.com/office/drawing/2014/main" id="{B6739ECB-7F97-4E41-B6F5-1D0E370BCAA0}"/>
+              </a:ext>
+            </a:extLst>
+          </p:cNvPr>
+          <p:cNvSpPr txBox="1"/>
+          <p:nvPr/>
+        </p:nvSpPr>
+        <p:spPr>
+          <a:xfrm rot="1683765">
+            <a:off x="3285201" y="3084840"/>
+            <a:ext cx="1050365" cy="246221"/>
+          </a:xfrm>
+          <a:prstGeom prst="rect">
+            <a:avLst/>
+          </a:prstGeom>
+          <a:noFill/>
+        </p:spPr>
+        <p:txBody>
+          <a:bodyPr wrap="square" rtlCol="0">
+            <a:spAutoFit/>
+          </a:bodyPr>
+          <a:lstStyle/>
+          <a:p>
+            <a:pPr algn="ctr"/>
+            <a:r>
+              <a:rPr lang="en-US" sz="1000" dirty="0"/>
+              <a:t>produces</a:t>
+            </a:r>
+          </a:p>
+        </p:txBody>
+      </p:sp>
+      <p:cxnSp>
+        <p:nvCxnSpPr>
+          <p:cNvPr id="191" name="Straight Arrow Connector 190">
+            <a:extLst>
+              <a:ext uri="{FF2B5EF4-FFF2-40B4-BE49-F238E27FC236}">
+                <a16:creationId xmlns:a16="http://schemas.microsoft.com/office/drawing/2014/main" id="{D955045B-7D57-9249-B159-CDEA6CBBA9AF}"/>
+              </a:ext>
+            </a:extLst>
+          </p:cNvPr>
+          <p:cNvCxnSpPr>
+            <a:cxnSpLocks/>
+            <a:stCxn id="51" idx="0"/>
+            <a:endCxn id="49" idx="2"/>
+          </p:cNvCxnSpPr>
+          <p:nvPr/>
+        </p:nvCxnSpPr>
+        <p:spPr>
+          <a:xfrm flipH="1" flipV="1">
+            <a:off x="8989218" y="2419844"/>
+            <a:ext cx="9271" cy="390988"/>
+          </a:xfrm>
+          <a:prstGeom prst="straightConnector1">
+            <a:avLst/>
+          </a:prstGeom>
+          <a:ln>
+            <a:solidFill>
+              <a:schemeClr val="tx1"/>
+            </a:solidFill>
+            <a:prstDash val="sysDash"/>
+            <a:headEnd type="none" w="med" len="med"/>
+            <a:tailEnd type="none" w="med" len="med"/>
+          </a:ln>
+        </p:spPr>
+        <p:style>
+          <a:lnRef idx="1">
+            <a:schemeClr val="accent1"/>
+          </a:lnRef>
+          <a:fillRef idx="0">
+            <a:schemeClr val="accent1"/>
+          </a:fillRef>
+          <a:effectRef idx="0">
+            <a:schemeClr val="accent1"/>
+          </a:effectRef>
+          <a:fontRef idx="minor">
+            <a:schemeClr val="tx1"/>
+          </a:fontRef>
+        </p:style>
+      </p:cxnSp>
+      <p:sp>
+        <p:nvSpPr>
+          <p:cNvPr id="211" name="TextBox 210">
+            <a:extLst>
+              <a:ext uri="{FF2B5EF4-FFF2-40B4-BE49-F238E27FC236}">
+                <a16:creationId xmlns:a16="http://schemas.microsoft.com/office/drawing/2014/main" id="{040941C1-7E43-7B49-A2F1-3EDD09968E9D}"/>
+              </a:ext>
+            </a:extLst>
+          </p:cNvPr>
+          <p:cNvSpPr txBox="1"/>
+          <p:nvPr/>
+        </p:nvSpPr>
+        <p:spPr>
+          <a:xfrm>
+            <a:off x="10620918" y="528833"/>
+            <a:ext cx="1725642" cy="461665"/>
+          </a:xfrm>
+          <a:prstGeom prst="rect">
+            <a:avLst/>
+          </a:prstGeom>
+          <a:noFill/>
+          <a:ln w="6350">
+            <a:solidFill>
+              <a:schemeClr val="tx1"/>
+            </a:solidFill>
+          </a:ln>
+        </p:spPr>
+        <p:txBody>
+          <a:bodyPr wrap="square" rtlCol="0">
+            <a:spAutoFit/>
+          </a:bodyPr>
+          <a:lstStyle/>
+          <a:p>
+            <a:pPr algn="ctr"/>
+            <a:r>
               <a:rPr lang="en-US" sz="1200" dirty="0"/>
               <a:t>&lt;&lt;interface&gt;&gt;</a:t>
             </a:r>
@@ -13807,17 +14561,105 @@
             <a:pPr algn="ctr"/>
             <a:r>
               <a:rPr lang="en-US" sz="1200" b="1" dirty="0"/>
-              <a:t>FlowStateMachine</a:t>
-            </a:r>
-          </a:p>
-        </p:txBody>
-      </p:sp>
-      <p:sp>
-        <p:nvSpPr>
-          <p:cNvPr id="287" name="Rectangle 286">
-            <a:extLst>
-              <a:ext uri="{FF2B5EF4-FFF2-40B4-BE49-F238E27FC236}">
-                <a16:creationId xmlns:a16="http://schemas.microsoft.com/office/drawing/2014/main" id="{2B527E4B-EC10-EB4D-B08F-AFAF8015C10D}"/>
+              <a:t>ActionExecutor</a:t>
+            </a:r>
+          </a:p>
+        </p:txBody>
+      </p:sp>
+      <p:cxnSp>
+        <p:nvCxnSpPr>
+          <p:cNvPr id="240" name="Straight Arrow Connector 239">
+            <a:extLst>
+              <a:ext uri="{FF2B5EF4-FFF2-40B4-BE49-F238E27FC236}">
+                <a16:creationId xmlns:a16="http://schemas.microsoft.com/office/drawing/2014/main" id="{E8E5B222-6BEF-CF45-B251-B51EA17193D0}"/>
+              </a:ext>
+            </a:extLst>
+          </p:cNvPr>
+          <p:cNvCxnSpPr>
+            <a:cxnSpLocks/>
+          </p:cNvCxnSpPr>
+          <p:nvPr/>
+        </p:nvCxnSpPr>
+        <p:spPr>
+          <a:xfrm flipH="1">
+            <a:off x="6795322" y="3315433"/>
+            <a:ext cx="1419181" cy="515279"/>
+          </a:xfrm>
+          <a:prstGeom prst="straightConnector1">
+            <a:avLst/>
+          </a:prstGeom>
+          <a:ln w="28575">
+            <a:solidFill>
+              <a:srgbClr val="FF0000"/>
+            </a:solidFill>
+            <a:tailEnd type="triangle"/>
+          </a:ln>
+        </p:spPr>
+        <p:style>
+          <a:lnRef idx="1">
+            <a:schemeClr val="accent1"/>
+          </a:lnRef>
+          <a:fillRef idx="0">
+            <a:schemeClr val="accent1"/>
+          </a:fillRef>
+          <a:effectRef idx="0">
+            <a:schemeClr val="accent1"/>
+          </a:effectRef>
+          <a:fontRef idx="minor">
+            <a:schemeClr val="tx1"/>
+          </a:fontRef>
+        </p:style>
+      </p:cxnSp>
+      <p:cxnSp>
+        <p:nvCxnSpPr>
+          <p:cNvPr id="262" name="Straight Arrow Connector 261">
+            <a:extLst>
+              <a:ext uri="{FF2B5EF4-FFF2-40B4-BE49-F238E27FC236}">
+                <a16:creationId xmlns:a16="http://schemas.microsoft.com/office/drawing/2014/main" id="{2BB91960-F3FB-0A40-A56C-C5732C7528A6}"/>
+              </a:ext>
+            </a:extLst>
+          </p:cNvPr>
+          <p:cNvCxnSpPr>
+            <a:cxnSpLocks/>
+          </p:cNvCxnSpPr>
+          <p:nvPr/>
+        </p:nvCxnSpPr>
+        <p:spPr>
+          <a:xfrm flipH="1">
+            <a:off x="9721533" y="2705865"/>
+            <a:ext cx="690509" cy="579398"/>
+          </a:xfrm>
+          <a:prstGeom prst="straightConnector1">
+            <a:avLst/>
+          </a:prstGeom>
+          <a:ln w="28575">
+            <a:solidFill>
+              <a:srgbClr val="FF0000"/>
+            </a:solidFill>
+            <a:tailEnd type="triangle"/>
+          </a:ln>
+        </p:spPr>
+        <p:style>
+          <a:lnRef idx="1">
+            <a:schemeClr val="accent1"/>
+          </a:lnRef>
+          <a:fillRef idx="0">
+            <a:schemeClr val="accent1"/>
+          </a:fillRef>
+          <a:effectRef idx="0">
+            <a:schemeClr val="accent1"/>
+          </a:effectRef>
+          <a:fontRef idx="minor">
+            <a:schemeClr val="tx1"/>
+          </a:fontRef>
+        </p:style>
+      </p:cxnSp>
+      <p:sp>
+        <p:nvSpPr>
+          <p:cNvPr id="269" name="Right Brace 268">
+            <a:extLst>
+              <a:ext uri="{FF2B5EF4-FFF2-40B4-BE49-F238E27FC236}">
+                <a16:creationId xmlns:a16="http://schemas.microsoft.com/office/drawing/2014/main" id="{E39E4C4F-FDCA-C04F-932C-6F79252E6D9B}"/>
               </a:ext>
             </a:extLst>
           </p:cNvPr>
@@ -13825,9 +14667,105 @@
           <p:nvPr/>
         </p:nvSpPr>
         <p:spPr>
-          <a:xfrm>
-            <a:off x="15818510" y="631070"/>
-            <a:ext cx="1114933" cy="461665"/>
+          <a:xfrm rot="10800000">
+            <a:off x="10394403" y="2354488"/>
+            <a:ext cx="175711" cy="705795"/>
+          </a:xfrm>
+          <a:prstGeom prst="rightBrace">
+            <a:avLst/>
+          </a:prstGeom>
+          <a:ln w="28575">
+            <a:solidFill>
+              <a:srgbClr val="FF0000"/>
+            </a:solidFill>
+          </a:ln>
+        </p:spPr>
+        <p:style>
+          <a:lnRef idx="1">
+            <a:schemeClr val="accent1"/>
+          </a:lnRef>
+          <a:fillRef idx="0">
+            <a:schemeClr val="accent1"/>
+          </a:fillRef>
+          <a:effectRef idx="0">
+            <a:schemeClr val="accent1"/>
+          </a:effectRef>
+          <a:fontRef idx="minor">
+            <a:schemeClr val="tx1"/>
+          </a:fontRef>
+        </p:style>
+        <p:txBody>
+          <a:bodyPr rtlCol="0" anchor="ctr"/>
+          <a:lstStyle/>
+          <a:p>
+            <a:pPr algn="ctr"/>
+            <a:endParaRPr lang="en-US"/>
+          </a:p>
+        </p:txBody>
+      </p:sp>
+      <p:cxnSp>
+        <p:nvCxnSpPr>
+          <p:cNvPr id="272" name="Straight Arrow Connector 271">
+            <a:extLst>
+              <a:ext uri="{FF2B5EF4-FFF2-40B4-BE49-F238E27FC236}">
+                <a16:creationId xmlns:a16="http://schemas.microsoft.com/office/drawing/2014/main" id="{E027AADD-2334-7F48-9CD8-7FE14CDA84C0}"/>
+              </a:ext>
+            </a:extLst>
+          </p:cNvPr>
+          <p:cNvCxnSpPr>
+            <a:cxnSpLocks/>
+            <a:stCxn id="211" idx="2"/>
+          </p:cNvCxnSpPr>
+          <p:nvPr/>
+        </p:nvCxnSpPr>
+        <p:spPr>
+          <a:xfrm>
+            <a:off x="11483739" y="990498"/>
+            <a:ext cx="2334" cy="722048"/>
+          </a:xfrm>
+          <a:prstGeom prst="straightConnector1">
+            <a:avLst/>
+          </a:prstGeom>
+          <a:ln>
+            <a:solidFill>
+              <a:schemeClr val="tx1"/>
+            </a:solidFill>
+            <a:prstDash val="sysDash"/>
+            <a:headEnd type="none" w="med" len="med"/>
+            <a:tailEnd type="none" w="med" len="med"/>
+          </a:ln>
+        </p:spPr>
+        <p:style>
+          <a:lnRef idx="1">
+            <a:schemeClr val="accent1"/>
+          </a:lnRef>
+          <a:fillRef idx="0">
+            <a:schemeClr val="accent1"/>
+          </a:fillRef>
+          <a:effectRef idx="0">
+            <a:schemeClr val="accent1"/>
+          </a:effectRef>
+          <a:fontRef idx="minor">
+            <a:schemeClr val="tx1"/>
+          </a:fontRef>
+        </p:style>
+      </p:cxnSp>
+      <p:sp>
+        <p:nvSpPr>
+          <p:cNvPr id="281" name="Rectangle 280">
+            <a:extLst>
+              <a:ext uri="{FF2B5EF4-FFF2-40B4-BE49-F238E27FC236}">
+                <a16:creationId xmlns:a16="http://schemas.microsoft.com/office/drawing/2014/main" id="{B0B8E156-8950-4A49-970A-34E12F2DAC6E}"/>
+              </a:ext>
+            </a:extLst>
+          </p:cNvPr>
+          <p:cNvSpPr/>
+          <p:nvPr/>
+        </p:nvSpPr>
+        <p:spPr>
+          <a:xfrm>
+            <a:off x="13277525" y="1850133"/>
+            <a:ext cx="2426629" cy="1182852"/>
           </a:xfrm>
           <a:prstGeom prst="rect">
             <a:avLst/>
@@ -13866,6 +14804,241 @@
       </p:sp>
       <p:sp>
         <p:nvSpPr>
+          <p:cNvPr id="283" name="Rectangle 282">
+            <a:extLst>
+              <a:ext uri="{FF2B5EF4-FFF2-40B4-BE49-F238E27FC236}">
+                <a16:creationId xmlns:a16="http://schemas.microsoft.com/office/drawing/2014/main" id="{ECD92F49-DA58-D246-9003-ADF945763F15}"/>
+              </a:ext>
+            </a:extLst>
+          </p:cNvPr>
+          <p:cNvSpPr/>
+          <p:nvPr/>
+        </p:nvSpPr>
+        <p:spPr>
+          <a:xfrm>
+            <a:off x="12607756" y="631004"/>
+            <a:ext cx="575895" cy="461665"/>
+          </a:xfrm>
+          <a:prstGeom prst="rect">
+            <a:avLst/>
+          </a:prstGeom>
+          <a:noFill/>
+          <a:ln>
+            <a:solidFill>
+              <a:schemeClr val="tx1"/>
+            </a:solidFill>
+          </a:ln>
+        </p:spPr>
+        <p:style>
+          <a:lnRef idx="2">
+            <a:schemeClr val="accent1">
+              <a:shade val="50000"/>
+            </a:schemeClr>
+          </a:lnRef>
+          <a:fillRef idx="1">
+            <a:schemeClr val="accent1"/>
+          </a:fillRef>
+          <a:effectRef idx="0">
+            <a:schemeClr val="accent1"/>
+          </a:effectRef>
+          <a:fontRef idx="minor">
+            <a:schemeClr val="lt1"/>
+          </a:fontRef>
+        </p:style>
+        <p:txBody>
+          <a:bodyPr rtlCol="0" anchor="ctr"/>
+          <a:lstStyle/>
+          <a:p>
+            <a:pPr algn="ctr"/>
+            <a:endParaRPr lang="en-US"/>
+          </a:p>
+        </p:txBody>
+      </p:sp>
+      <p:sp>
+        <p:nvSpPr>
+          <p:cNvPr id="284" name="TextBox 283">
+            <a:extLst>
+              <a:ext uri="{FF2B5EF4-FFF2-40B4-BE49-F238E27FC236}">
+                <a16:creationId xmlns:a16="http://schemas.microsoft.com/office/drawing/2014/main" id="{944D5A21-76C1-4243-A4DA-7B175EFB05FE}"/>
+              </a:ext>
+            </a:extLst>
+          </p:cNvPr>
+          <p:cNvSpPr txBox="1"/>
+          <p:nvPr/>
+        </p:nvSpPr>
+        <p:spPr>
+          <a:xfrm>
+            <a:off x="12607756" y="723336"/>
+            <a:ext cx="575895" cy="276999"/>
+          </a:xfrm>
+          <a:prstGeom prst="rect">
+            <a:avLst/>
+          </a:prstGeom>
+          <a:noFill/>
+        </p:spPr>
+        <p:txBody>
+          <a:bodyPr wrap="square" rtlCol="0">
+            <a:spAutoFit/>
+          </a:bodyPr>
+          <a:lstStyle/>
+          <a:p>
+            <a:pPr algn="ctr"/>
+            <a:r>
+              <a:rPr lang="en-US" sz="1200" b="1" dirty="0"/>
+              <a:t>Fiber</a:t>
+            </a:r>
+          </a:p>
+        </p:txBody>
+      </p:sp>
+      <p:sp>
+        <p:nvSpPr>
+          <p:cNvPr id="285" name="Rectangle 284">
+            <a:extLst>
+              <a:ext uri="{FF2B5EF4-FFF2-40B4-BE49-F238E27FC236}">
+                <a16:creationId xmlns:a16="http://schemas.microsoft.com/office/drawing/2014/main" id="{540FE9E5-48C2-734B-A408-26FE12A96188}"/>
+              </a:ext>
+            </a:extLst>
+          </p:cNvPr>
+          <p:cNvSpPr/>
+          <p:nvPr/>
+        </p:nvSpPr>
+        <p:spPr>
+          <a:xfrm>
+            <a:off x="13375536" y="631004"/>
+            <a:ext cx="1725643" cy="461665"/>
+          </a:xfrm>
+          <a:prstGeom prst="rect">
+            <a:avLst/>
+          </a:prstGeom>
+          <a:noFill/>
+          <a:ln>
+            <a:solidFill>
+              <a:schemeClr val="tx1"/>
+            </a:solidFill>
+          </a:ln>
+        </p:spPr>
+        <p:style>
+          <a:lnRef idx="2">
+            <a:schemeClr val="accent1">
+              <a:shade val="50000"/>
+            </a:schemeClr>
+          </a:lnRef>
+          <a:fillRef idx="1">
+            <a:schemeClr val="accent1"/>
+          </a:fillRef>
+          <a:effectRef idx="0">
+            <a:schemeClr val="accent1"/>
+          </a:effectRef>
+          <a:fontRef idx="minor">
+            <a:schemeClr val="lt1"/>
+          </a:fontRef>
+        </p:style>
+        <p:txBody>
+          <a:bodyPr rtlCol="0" anchor="ctr"/>
+          <a:lstStyle/>
+          <a:p>
+            <a:pPr algn="ctr"/>
+            <a:endParaRPr lang="en-US"/>
+          </a:p>
+        </p:txBody>
+      </p:sp>
+      <p:sp>
+        <p:nvSpPr>
+          <p:cNvPr id="286" name="TextBox 285">
+            <a:extLst>
+              <a:ext uri="{FF2B5EF4-FFF2-40B4-BE49-F238E27FC236}">
+                <a16:creationId xmlns:a16="http://schemas.microsoft.com/office/drawing/2014/main" id="{A5DB5365-C15B-B145-9E40-453F24251374}"/>
+              </a:ext>
+            </a:extLst>
+          </p:cNvPr>
+          <p:cNvSpPr txBox="1"/>
+          <p:nvPr/>
+        </p:nvSpPr>
+        <p:spPr>
+          <a:xfrm>
+            <a:off x="13375532" y="631004"/>
+            <a:ext cx="1725642" cy="461665"/>
+          </a:xfrm>
+          <a:prstGeom prst="rect">
+            <a:avLst/>
+          </a:prstGeom>
+          <a:noFill/>
+        </p:spPr>
+        <p:txBody>
+          <a:bodyPr wrap="square" rtlCol="0">
+            <a:spAutoFit/>
+          </a:bodyPr>
+          <a:lstStyle/>
+          <a:p>
+            <a:pPr algn="ctr"/>
+            <a:r>
+              <a:rPr lang="en-US" sz="1200" dirty="0"/>
+              <a:t>&lt;&lt;interface&gt;&gt;</a:t>
+            </a:r>
+          </a:p>
+          <a:p>
+            <a:pPr algn="ctr"/>
+            <a:r>
+              <a:rPr lang="en-US" sz="1200" b="1" dirty="0"/>
+              <a:t>FlowStateMachine</a:t>
+            </a:r>
+          </a:p>
+        </p:txBody>
+      </p:sp>
+      <p:sp>
+        <p:nvSpPr>
+          <p:cNvPr id="287" name="Rectangle 286">
+            <a:extLst>
+              <a:ext uri="{FF2B5EF4-FFF2-40B4-BE49-F238E27FC236}">
+                <a16:creationId xmlns:a16="http://schemas.microsoft.com/office/drawing/2014/main" id="{2B527E4B-EC10-EB4D-B08F-AFAF8015C10D}"/>
+              </a:ext>
+            </a:extLst>
+          </p:cNvPr>
+          <p:cNvSpPr/>
+          <p:nvPr/>
+        </p:nvSpPr>
+        <p:spPr>
+          <a:xfrm>
+            <a:off x="15293061" y="631004"/>
+            <a:ext cx="1114933" cy="461665"/>
+          </a:xfrm>
+          <a:prstGeom prst="rect">
+            <a:avLst/>
+          </a:prstGeom>
+          <a:noFill/>
+          <a:ln>
+            <a:solidFill>
+              <a:schemeClr val="tx1"/>
+            </a:solidFill>
+          </a:ln>
+        </p:spPr>
+        <p:style>
+          <a:lnRef idx="2">
+            <a:schemeClr val="accent1">
+              <a:shade val="50000"/>
+            </a:schemeClr>
+          </a:lnRef>
+          <a:fillRef idx="1">
+            <a:schemeClr val="accent1"/>
+          </a:fillRef>
+          <a:effectRef idx="0">
+            <a:schemeClr val="accent1"/>
+          </a:effectRef>
+          <a:fontRef idx="minor">
+            <a:schemeClr val="lt1"/>
+          </a:fontRef>
+        </p:style>
+        <p:txBody>
+          <a:bodyPr rtlCol="0" anchor="ctr"/>
+          <a:lstStyle/>
+          <a:p>
+            <a:pPr algn="ctr"/>
+            <a:endParaRPr lang="en-US"/>
+          </a:p>
+        </p:txBody>
+      </p:sp>
+      <p:sp>
+        <p:nvSpPr>
           <p:cNvPr id="288" name="TextBox 287">
             <a:extLst>
               <a:ext uri="{FF2B5EF4-FFF2-40B4-BE49-F238E27FC236}">
@@ -13878,7 +15051,7 @@
         </p:nvSpPr>
         <p:spPr>
           <a:xfrm>
-            <a:off x="15818508" y="631070"/>
+            <a:off x="15293059" y="631004"/>
             <a:ext cx="1114935" cy="461665"/>
           </a:xfrm>
           <a:prstGeom prst="rect">
@@ -13925,7 +15098,7 @@
         </p:nvCxnSpPr>
         <p:spPr>
           <a:xfrm flipH="1" flipV="1">
-            <a:off x="14763802" y="1092735"/>
+            <a:off x="14238353" y="1092669"/>
             <a:ext cx="250154" cy="767285"/>
           </a:xfrm>
           <a:prstGeom prst="straightConnector1">
@@ -13973,7 +15146,7 @@
         </p:nvCxnSpPr>
         <p:spPr>
           <a:xfrm flipV="1">
-            <a:off x="15016289" y="1092735"/>
+            <a:off x="14490840" y="1092669"/>
             <a:ext cx="1359687" cy="757465"/>
           </a:xfrm>
           <a:prstGeom prst="straightConnector1">
@@ -14021,7 +15194,7 @@
         </p:nvCxnSpPr>
         <p:spPr>
           <a:xfrm flipH="1" flipV="1">
-            <a:off x="13421152" y="1092735"/>
+            <a:off x="12895703" y="1092669"/>
             <a:ext cx="1595136" cy="757465"/>
           </a:xfrm>
           <a:prstGeom prst="straightConnector1">
@@ -14053,10 +15226,10 @@
       </p:cxnSp>
       <p:sp>
         <p:nvSpPr>
-          <p:cNvPr id="104" name="TextBox 103">
-            <a:extLst>
-              <a:ext uri="{FF2B5EF4-FFF2-40B4-BE49-F238E27FC236}">
-                <a16:creationId xmlns:a16="http://schemas.microsoft.com/office/drawing/2014/main" id="{BF507E43-9257-7E48-AED4-73318B3DB8BE}"/>
+          <p:cNvPr id="369" name="TextBox 368">
+            <a:extLst>
+              <a:ext uri="{FF2B5EF4-FFF2-40B4-BE49-F238E27FC236}">
+                <a16:creationId xmlns:a16="http://schemas.microsoft.com/office/drawing/2014/main" id="{ECEA15E4-B08E-2440-8767-419FA62BB4E7}"/>
               </a:ext>
             </a:extLst>
           </p:cNvPr>
@@ -14065,13 +15238,18 @@
         </p:nvSpPr>
         <p:spPr>
           <a:xfrm>
-            <a:off x="18006231" y="2999416"/>
-            <a:ext cx="1411161" cy="276999"/>
+            <a:off x="11778118" y="3738404"/>
+            <a:ext cx="1930982" cy="646331"/>
           </a:xfrm>
           <a:prstGeom prst="rect">
             <a:avLst/>
           </a:prstGeom>
           <a:noFill/>
+          <a:ln w="6350">
+            <a:solidFill>
+              <a:schemeClr val="tx1"/>
+            </a:solidFill>
+          </a:ln>
         </p:spPr>
         <p:txBody>
           <a:bodyPr wrap="square" rtlCol="0">
@@ -14082,520 +15260,27 @@
             <a:pPr algn="ctr"/>
             <a:r>
               <a:rPr lang="en-US" sz="1200" b="1" dirty="0"/>
-              <a:t>Event Queue</a:t>
-            </a:r>
-          </a:p>
-        </p:txBody>
-      </p:sp>
-      <p:sp>
-        <p:nvSpPr>
-          <p:cNvPr id="105" name="Rectangle 104">
-            <a:extLst>
-              <a:ext uri="{FF2B5EF4-FFF2-40B4-BE49-F238E27FC236}">
-                <a16:creationId xmlns:a16="http://schemas.microsoft.com/office/drawing/2014/main" id="{B6A5E57B-1922-8544-9469-8DD2C5DA4CCF}"/>
-              </a:ext>
-            </a:extLst>
-          </p:cNvPr>
-          <p:cNvSpPr/>
-          <p:nvPr/>
-        </p:nvSpPr>
-        <p:spPr>
-          <a:xfrm>
-            <a:off x="18006233" y="2999416"/>
-            <a:ext cx="1411159" cy="276999"/>
-          </a:xfrm>
-          <a:prstGeom prst="rect">
-            <a:avLst/>
-          </a:prstGeom>
-          <a:noFill/>
-          <a:ln>
-            <a:solidFill>
-              <a:schemeClr val="tx1"/>
-            </a:solidFill>
-          </a:ln>
-        </p:spPr>
-        <p:style>
-          <a:lnRef idx="2">
-            <a:schemeClr val="accent1">
-              <a:shade val="50000"/>
-            </a:schemeClr>
-          </a:lnRef>
-          <a:fillRef idx="1">
-            <a:schemeClr val="accent1"/>
-          </a:fillRef>
-          <a:effectRef idx="0">
-            <a:schemeClr val="accent1"/>
-          </a:effectRef>
-          <a:fontRef idx="minor">
-            <a:schemeClr val="lt1"/>
-          </a:fontRef>
-        </p:style>
-        <p:txBody>
-          <a:bodyPr rtlCol="0" anchor="ctr"/>
-          <a:lstStyle/>
-          <a:p>
-            <a:pPr algn="ctr"/>
-            <a:endParaRPr lang="en-US"/>
+              <a:t>TransitionExecutorImpl</a:t>
+            </a:r>
+          </a:p>
+          <a:p>
+            <a:pPr algn="ctr"/>
+            <a:endParaRPr lang="en-US" sz="1200" b="1" dirty="0"/>
+          </a:p>
+          <a:p>
+            <a:r>
+              <a:rPr lang="en-US" sz="1200" dirty="0"/>
+              <a:t>executeTransition()</a:t>
+            </a:r>
           </a:p>
         </p:txBody>
       </p:sp>
       <p:cxnSp>
         <p:nvCxnSpPr>
-          <p:cNvPr id="129" name="Straight Arrow Connector 128">
-            <a:extLst>
-              <a:ext uri="{FF2B5EF4-FFF2-40B4-BE49-F238E27FC236}">
-                <a16:creationId xmlns:a16="http://schemas.microsoft.com/office/drawing/2014/main" id="{F9EBFC5A-5A8E-5F47-B43C-BFE0E99C67C7}"/>
-              </a:ext>
-            </a:extLst>
-          </p:cNvPr>
-          <p:cNvCxnSpPr>
-            <a:cxnSpLocks/>
-            <a:stCxn id="105" idx="2"/>
-          </p:cNvCxnSpPr>
-          <p:nvPr/>
-        </p:nvCxnSpPr>
-        <p:spPr>
-          <a:xfrm rot="5400000" flipH="1">
-            <a:off x="17144528" y="1709131"/>
-            <a:ext cx="535988" cy="2598581"/>
-          </a:xfrm>
-          <a:prstGeom prst="bentConnector4">
-            <a:avLst>
-              <a:gd name="adj1" fmla="val -42650"/>
-              <a:gd name="adj2" fmla="val 89490"/>
-            </a:avLst>
-          </a:prstGeom>
-          <a:ln w="28575">
-            <a:solidFill>
-              <a:srgbClr val="FF0000"/>
-            </a:solidFill>
-            <a:headEnd type="triangle" w="med" len="med"/>
-            <a:tailEnd type="triangle" w="med" len="med"/>
-          </a:ln>
-        </p:spPr>
-        <p:style>
-          <a:lnRef idx="1">
-            <a:schemeClr val="accent1"/>
-          </a:lnRef>
-          <a:fillRef idx="0">
-            <a:schemeClr val="accent1"/>
-          </a:fillRef>
-          <a:effectRef idx="0">
-            <a:schemeClr val="accent1"/>
-          </a:effectRef>
-          <a:fontRef idx="minor">
-            <a:schemeClr val="tx1"/>
-          </a:fontRef>
-        </p:style>
-      </p:cxnSp>
-      <p:sp>
-        <p:nvSpPr>
-          <p:cNvPr id="140" name="TextBox 139">
-            <a:extLst>
-              <a:ext uri="{FF2B5EF4-FFF2-40B4-BE49-F238E27FC236}">
-                <a16:creationId xmlns:a16="http://schemas.microsoft.com/office/drawing/2014/main" id="{335C34DA-7A1A-BC42-BA2B-A72E24B7E6F5}"/>
-              </a:ext>
-            </a:extLst>
-          </p:cNvPr>
-          <p:cNvSpPr txBox="1"/>
-          <p:nvPr/>
-        </p:nvSpPr>
-        <p:spPr>
-          <a:xfrm>
-            <a:off x="16346093" y="3293132"/>
-            <a:ext cx="1787708" cy="215444"/>
-          </a:xfrm>
-          <a:prstGeom prst="rect">
-            <a:avLst/>
-          </a:prstGeom>
-          <a:noFill/>
-        </p:spPr>
-        <p:txBody>
-          <a:bodyPr wrap="square" rtlCol="0">
-            <a:spAutoFit/>
-          </a:bodyPr>
-          <a:lstStyle/>
-          <a:p>
-            <a:pPr algn="ctr"/>
-            <a:r>
-              <a:rPr lang="en-US" sz="800" dirty="0"/>
-              <a:t>Dequeue: </a:t>
-            </a:r>
-            <a:r>
-              <a:rPr lang="en-US" sz="800" b="1" dirty="0"/>
-              <a:t>DoRemainingWork</a:t>
-            </a:r>
-          </a:p>
-        </p:txBody>
-      </p:sp>
-      <p:sp>
-        <p:nvSpPr>
-          <p:cNvPr id="143" name="Rectangle 142">
-            <a:extLst>
-              <a:ext uri="{FF2B5EF4-FFF2-40B4-BE49-F238E27FC236}">
-                <a16:creationId xmlns:a16="http://schemas.microsoft.com/office/drawing/2014/main" id="{6783A7BB-4963-624E-B313-CAF001CCBE96}"/>
-              </a:ext>
-            </a:extLst>
-          </p:cNvPr>
-          <p:cNvSpPr/>
-          <p:nvPr/>
-        </p:nvSpPr>
-        <p:spPr>
-          <a:xfrm>
-            <a:off x="14485455" y="5117822"/>
-            <a:ext cx="1066322" cy="698446"/>
-          </a:xfrm>
-          <a:prstGeom prst="rect">
-            <a:avLst/>
-          </a:prstGeom>
-          <a:noFill/>
-          <a:ln>
-            <a:solidFill>
-              <a:schemeClr val="tx1"/>
-            </a:solidFill>
-          </a:ln>
-        </p:spPr>
-        <p:style>
-          <a:lnRef idx="2">
-            <a:schemeClr val="accent1">
-              <a:shade val="50000"/>
-            </a:schemeClr>
-          </a:lnRef>
-          <a:fillRef idx="1">
-            <a:schemeClr val="accent1"/>
-          </a:fillRef>
-          <a:effectRef idx="0">
-            <a:schemeClr val="accent1"/>
-          </a:effectRef>
-          <a:fontRef idx="minor">
-            <a:schemeClr val="lt1"/>
-          </a:fontRef>
-        </p:style>
-        <p:txBody>
-          <a:bodyPr rtlCol="0" anchor="ctr"/>
-          <a:lstStyle/>
-          <a:p>
-            <a:pPr algn="ctr"/>
-            <a:endParaRPr lang="en-US"/>
-          </a:p>
-        </p:txBody>
-      </p:sp>
-      <p:sp>
-        <p:nvSpPr>
-          <p:cNvPr id="144" name="TextBox 143">
-            <a:extLst>
-              <a:ext uri="{FF2B5EF4-FFF2-40B4-BE49-F238E27FC236}">
-                <a16:creationId xmlns:a16="http://schemas.microsoft.com/office/drawing/2014/main" id="{D3ACF2D4-1F36-654D-A896-9E4A6EB6B7B6}"/>
-              </a:ext>
-            </a:extLst>
-          </p:cNvPr>
-          <p:cNvSpPr txBox="1"/>
-          <p:nvPr/>
-        </p:nvSpPr>
-        <p:spPr>
-          <a:xfrm>
-            <a:off x="14480795" y="5127645"/>
-            <a:ext cx="1066323" cy="646331"/>
-          </a:xfrm>
-          <a:prstGeom prst="rect">
-            <a:avLst/>
-          </a:prstGeom>
-          <a:noFill/>
-        </p:spPr>
-        <p:txBody>
-          <a:bodyPr wrap="square" rtlCol="0">
-            <a:spAutoFit/>
-          </a:bodyPr>
-          <a:lstStyle/>
-          <a:p>
-            <a:pPr algn="ctr"/>
-            <a:r>
-              <a:rPr lang="en-US" sz="1200" b="1" dirty="0"/>
-              <a:t>StateMachine</a:t>
-            </a:r>
-          </a:p>
-          <a:p>
-            <a:pPr algn="ctr"/>
-            <a:endParaRPr lang="en-US" sz="1200" b="1" dirty="0"/>
-          </a:p>
-          <a:p>
-            <a:r>
-              <a:rPr lang="en-US" sz="1200" dirty="0"/>
-              <a:t>transition()</a:t>
-            </a:r>
-          </a:p>
-        </p:txBody>
-      </p:sp>
-      <p:sp>
-        <p:nvSpPr>
-          <p:cNvPr id="146" name="TextBox 145">
-            <a:extLst>
-              <a:ext uri="{FF2B5EF4-FFF2-40B4-BE49-F238E27FC236}">
-                <a16:creationId xmlns:a16="http://schemas.microsoft.com/office/drawing/2014/main" id="{8CB24272-60B8-584C-9968-BC00BDBF76A5}"/>
-              </a:ext>
-            </a:extLst>
-          </p:cNvPr>
-          <p:cNvSpPr txBox="1"/>
-          <p:nvPr/>
-        </p:nvSpPr>
-        <p:spPr>
-          <a:xfrm>
-            <a:off x="16571956" y="5048796"/>
-            <a:ext cx="1434275" cy="830997"/>
-          </a:xfrm>
-          <a:prstGeom prst="rect">
-            <a:avLst/>
-          </a:prstGeom>
-          <a:noFill/>
-          <a:ln w="6350">
-            <a:solidFill>
-              <a:schemeClr val="tx1"/>
-            </a:solidFill>
-          </a:ln>
-        </p:spPr>
-        <p:txBody>
-          <a:bodyPr wrap="square" rtlCol="0">
-            <a:spAutoFit/>
-          </a:bodyPr>
-          <a:lstStyle/>
-          <a:p>
-            <a:pPr algn="ctr"/>
-            <a:r>
-              <a:rPr lang="en-US" sz="1200" b="1" dirty="0"/>
-              <a:t>TopLevelTransition</a:t>
-            </a:r>
-          </a:p>
-          <a:p>
-            <a:pPr algn="ctr"/>
-            <a:endParaRPr lang="en-US" sz="1200" b="1" dirty="0"/>
-          </a:p>
-          <a:p>
-            <a:r>
-              <a:rPr lang="en-US" sz="1200" dirty="0"/>
-              <a:t>transition()</a:t>
-            </a:r>
-          </a:p>
-          <a:p>
-            <a:r>
-              <a:rPr lang="en-US" sz="1200" dirty="0"/>
-              <a:t>suspendTransition()</a:t>
-            </a:r>
-          </a:p>
-        </p:txBody>
-      </p:sp>
-      <p:sp>
-        <p:nvSpPr>
-          <p:cNvPr id="180" name="Rectangle 179">
-            <a:extLst>
-              <a:ext uri="{FF2B5EF4-FFF2-40B4-BE49-F238E27FC236}">
-                <a16:creationId xmlns:a16="http://schemas.microsoft.com/office/drawing/2014/main" id="{E195B45E-9933-544F-B0E5-8AE9B35A5A2C}"/>
-              </a:ext>
-            </a:extLst>
-          </p:cNvPr>
-          <p:cNvSpPr/>
-          <p:nvPr/>
-        </p:nvSpPr>
-        <p:spPr>
-          <a:xfrm>
-            <a:off x="19390254" y="4046278"/>
-            <a:ext cx="2072203" cy="840819"/>
-          </a:xfrm>
-          <a:prstGeom prst="rect">
-            <a:avLst/>
-          </a:prstGeom>
-          <a:noFill/>
-          <a:ln>
-            <a:solidFill>
-              <a:schemeClr val="tx1"/>
-            </a:solidFill>
-          </a:ln>
-        </p:spPr>
-        <p:style>
-          <a:lnRef idx="2">
-            <a:schemeClr val="accent1">
-              <a:shade val="50000"/>
-            </a:schemeClr>
-          </a:lnRef>
-          <a:fillRef idx="1">
-            <a:schemeClr val="accent1"/>
-          </a:fillRef>
-          <a:effectRef idx="0">
-            <a:schemeClr val="accent1"/>
-          </a:effectRef>
-          <a:fontRef idx="minor">
-            <a:schemeClr val="lt1"/>
-          </a:fontRef>
-        </p:style>
-        <p:txBody>
-          <a:bodyPr rtlCol="0" anchor="ctr"/>
-          <a:lstStyle/>
-          <a:p>
-            <a:pPr algn="ctr"/>
-            <a:endParaRPr lang="en-US"/>
-          </a:p>
-        </p:txBody>
-      </p:sp>
-      <p:sp>
-        <p:nvSpPr>
-          <p:cNvPr id="181" name="TextBox 180">
-            <a:extLst>
-              <a:ext uri="{FF2B5EF4-FFF2-40B4-BE49-F238E27FC236}">
-                <a16:creationId xmlns:a16="http://schemas.microsoft.com/office/drawing/2014/main" id="{9320AB9A-F82D-AD4B-9235-644736299C07}"/>
-              </a:ext>
-            </a:extLst>
-          </p:cNvPr>
-          <p:cNvSpPr txBox="1"/>
-          <p:nvPr/>
-        </p:nvSpPr>
-        <p:spPr>
-          <a:xfrm>
-            <a:off x="19385594" y="4056100"/>
-            <a:ext cx="2076863" cy="830997"/>
-          </a:xfrm>
-          <a:prstGeom prst="rect">
-            <a:avLst/>
-          </a:prstGeom>
-          <a:noFill/>
-        </p:spPr>
-        <p:txBody>
-          <a:bodyPr wrap="square" rtlCol="0">
-            <a:spAutoFit/>
-          </a:bodyPr>
-          <a:lstStyle/>
-          <a:p>
-            <a:pPr algn="ctr"/>
-            <a:r>
-              <a:rPr lang="en-US" sz="1200" b="1" dirty="0"/>
-              <a:t>DoRemainingWorkTransition</a:t>
-            </a:r>
-          </a:p>
-          <a:p>
-            <a:pPr algn="ctr"/>
-            <a:endParaRPr lang="en-US" sz="1200" b="1" dirty="0"/>
-          </a:p>
-          <a:p>
-            <a:r>
-              <a:rPr lang="en-US" sz="1200" dirty="0"/>
-              <a:t>transition()</a:t>
-            </a:r>
-          </a:p>
-          <a:p>
-            <a:r>
-              <a:rPr lang="en-US" sz="1200" dirty="0"/>
-              <a:t>cleanTransition()</a:t>
-            </a:r>
-          </a:p>
-        </p:txBody>
-      </p:sp>
-      <p:sp>
-        <p:nvSpPr>
-          <p:cNvPr id="185" name="TextBox 184">
-            <a:extLst>
-              <a:ext uri="{FF2B5EF4-FFF2-40B4-BE49-F238E27FC236}">
-                <a16:creationId xmlns:a16="http://schemas.microsoft.com/office/drawing/2014/main" id="{65B96109-7CE7-7049-A23C-8B59507944FA}"/>
-              </a:ext>
-            </a:extLst>
-          </p:cNvPr>
-          <p:cNvSpPr txBox="1"/>
-          <p:nvPr/>
-        </p:nvSpPr>
-        <p:spPr>
-          <a:xfrm rot="20118368">
-            <a:off x="17697397" y="4733415"/>
-            <a:ext cx="1787708" cy="215444"/>
-          </a:xfrm>
-          <a:prstGeom prst="rect">
-            <a:avLst/>
-          </a:prstGeom>
-          <a:noFill/>
-        </p:spPr>
-        <p:txBody>
-          <a:bodyPr wrap="square" rtlCol="0">
-            <a:spAutoFit/>
-          </a:bodyPr>
-          <a:lstStyle/>
-          <a:p>
-            <a:pPr algn="ctr"/>
-            <a:r>
-              <a:rPr lang="en-US" sz="800" dirty="0"/>
-              <a:t>When </a:t>
-            </a:r>
-            <a:r>
-              <a:rPr lang="en-US" sz="800" b="1" dirty="0"/>
-              <a:t>DoRemainingWork</a:t>
-            </a:r>
-          </a:p>
-        </p:txBody>
-      </p:sp>
-      <p:sp>
-        <p:nvSpPr>
-          <p:cNvPr id="189" name="TextBox 188">
-            <a:extLst>
-              <a:ext uri="{FF2B5EF4-FFF2-40B4-BE49-F238E27FC236}">
-                <a16:creationId xmlns:a16="http://schemas.microsoft.com/office/drawing/2014/main" id="{F434C336-9DBB-C34D-ADDE-61C7458090D5}"/>
-              </a:ext>
-            </a:extLst>
-          </p:cNvPr>
-          <p:cNvSpPr txBox="1"/>
-          <p:nvPr/>
-        </p:nvSpPr>
-        <p:spPr>
-          <a:xfrm>
-            <a:off x="21989210" y="3508576"/>
-            <a:ext cx="2072203" cy="1015663"/>
-          </a:xfrm>
-          <a:prstGeom prst="rect">
-            <a:avLst/>
-          </a:prstGeom>
-          <a:noFill/>
-          <a:ln w="6350">
-            <a:solidFill>
-              <a:schemeClr val="tx1"/>
-            </a:solidFill>
-          </a:ln>
-        </p:spPr>
-        <p:txBody>
-          <a:bodyPr wrap="square" rtlCol="0">
-            <a:spAutoFit/>
-          </a:bodyPr>
-          <a:lstStyle/>
-          <a:p>
-            <a:pPr algn="ctr"/>
-            <a:r>
-              <a:rPr lang="en-US" sz="1200" b="1" dirty="0"/>
-              <a:t>StartedFlowTransition</a:t>
-            </a:r>
-          </a:p>
-          <a:p>
-            <a:pPr algn="ctr"/>
-            <a:endParaRPr lang="en-US" sz="1200" b="1" dirty="0"/>
-          </a:p>
-          <a:p>
-            <a:r>
-              <a:rPr lang="en-US" sz="1200" dirty="0"/>
-              <a:t>transition()</a:t>
-            </a:r>
-          </a:p>
-          <a:p>
-            <a:r>
-              <a:rPr lang="en-US" sz="1200" dirty="0"/>
-              <a:t>receiveTransition()</a:t>
-            </a:r>
-          </a:p>
-          <a:p>
-            <a:r>
-              <a:rPr lang="en-US" sz="1200" dirty="0"/>
-              <a:t>sendTransition()</a:t>
-            </a:r>
-          </a:p>
-        </p:txBody>
-      </p:sp>
-      <p:cxnSp>
-        <p:nvCxnSpPr>
-          <p:cNvPr id="266" name="Straight Arrow Connector 265">
-            <a:extLst>
-              <a:ext uri="{FF2B5EF4-FFF2-40B4-BE49-F238E27FC236}">
-                <a16:creationId xmlns:a16="http://schemas.microsoft.com/office/drawing/2014/main" id="{26498E20-DECF-5D46-8185-B520023716F4}"/>
+          <p:cNvPr id="370" name="Straight Arrow Connector 369">
+            <a:extLst>
+              <a:ext uri="{FF2B5EF4-FFF2-40B4-BE49-F238E27FC236}">
+                <a16:creationId xmlns:a16="http://schemas.microsoft.com/office/drawing/2014/main" id="{3AEC6AA8-595B-3840-8E77-EB69983CD7B4}"/>
               </a:ext>
             </a:extLst>
           </p:cNvPr>
@@ -14605,20 +15290,18 @@
           <p:nvPr/>
         </p:nvCxnSpPr>
         <p:spPr>
-          <a:xfrm rot="10800000" flipV="1">
-            <a:off x="14822107" y="2800429"/>
-            <a:ext cx="383698" cy="164181"/>
-          </a:xfrm>
-          <a:prstGeom prst="bentConnector3">
-            <a:avLst>
-              <a:gd name="adj1" fmla="val -490"/>
-            </a:avLst>
+          <a:xfrm flipH="1">
+            <a:off x="13079186" y="3010551"/>
+            <a:ext cx="845735" cy="1289411"/>
+          </a:xfrm>
+          <a:prstGeom prst="straightConnector1">
+            <a:avLst/>
           </a:prstGeom>
           <a:ln w="28575">
             <a:solidFill>
               <a:srgbClr val="FF0000"/>
             </a:solidFill>
-            <a:headEnd type="none" w="med" len="med"/>
+            <a:headEnd type="triangle" w="med" len="med"/>
             <a:tailEnd type="triangle" w="med" len="med"/>
           </a:ln>
         </p:spPr>
@@ -14639,10 +15322,10 @@
       </p:cxnSp>
       <p:cxnSp>
         <p:nvCxnSpPr>
-          <p:cNvPr id="290" name="Straight Arrow Connector 289">
-            <a:extLst>
-              <a:ext uri="{FF2B5EF4-FFF2-40B4-BE49-F238E27FC236}">
-                <a16:creationId xmlns:a16="http://schemas.microsoft.com/office/drawing/2014/main" id="{043876B0-7BE2-D74B-992E-8ABB2EA9A0AC}"/>
+          <p:cNvPr id="381" name="Straight Arrow Connector 380">
+            <a:extLst>
+              <a:ext uri="{FF2B5EF4-FFF2-40B4-BE49-F238E27FC236}">
+                <a16:creationId xmlns:a16="http://schemas.microsoft.com/office/drawing/2014/main" id="{1D2BCBFC-2BF0-994F-B50F-28D5EFBB0AF9}"/>
               </a:ext>
             </a:extLst>
           </p:cNvPr>
@@ -14652,9 +15335,9 @@
           <p:nvPr/>
         </p:nvCxnSpPr>
         <p:spPr>
-          <a:xfrm>
-            <a:off x="13985482" y="2987741"/>
-            <a:ext cx="559110" cy="2625420"/>
+          <a:xfrm flipH="1" flipV="1">
+            <a:off x="11209244" y="3254839"/>
+            <a:ext cx="712448" cy="876794"/>
           </a:xfrm>
           <a:prstGeom prst="straightConnector1">
             <a:avLst/>
@@ -14663,8 +15346,101 @@
             <a:solidFill>
               <a:srgbClr val="FF0000"/>
             </a:solidFill>
-            <a:headEnd type="none" w="med" len="med"/>
+            <a:headEnd type="triangle" w="med" len="med"/>
             <a:tailEnd type="triangle" w="med" len="med"/>
+          </a:ln>
+        </p:spPr>
+        <p:style>
+          <a:lnRef idx="1">
+            <a:schemeClr val="accent1"/>
+          </a:lnRef>
+          <a:fillRef idx="0">
+            <a:schemeClr val="accent1"/>
+          </a:fillRef>
+          <a:effectRef idx="0">
+            <a:schemeClr val="accent1"/>
+          </a:effectRef>
+          <a:fontRef idx="minor">
+            <a:schemeClr val="tx1"/>
+          </a:fontRef>
+        </p:style>
+      </p:cxnSp>
+      <p:sp>
+        <p:nvSpPr>
+          <p:cNvPr id="385" name="Right Brace 384">
+            <a:extLst>
+              <a:ext uri="{FF2B5EF4-FFF2-40B4-BE49-F238E27FC236}">
+                <a16:creationId xmlns:a16="http://schemas.microsoft.com/office/drawing/2014/main" id="{117C91B9-39DD-D046-BC9B-C37EF15CB7E8}"/>
+              </a:ext>
+            </a:extLst>
+          </p:cNvPr>
+          <p:cNvSpPr/>
+          <p:nvPr/>
+        </p:nvSpPr>
+        <p:spPr>
+          <a:xfrm>
+            <a:off x="12216890" y="2471981"/>
+            <a:ext cx="175709" cy="588302"/>
+          </a:xfrm>
+          <a:prstGeom prst="rightBrace">
+            <a:avLst/>
+          </a:prstGeom>
+          <a:ln w="28575">
+            <a:solidFill>
+              <a:srgbClr val="FF0000"/>
+            </a:solidFill>
+          </a:ln>
+        </p:spPr>
+        <p:style>
+          <a:lnRef idx="1">
+            <a:schemeClr val="accent1"/>
+          </a:lnRef>
+          <a:fillRef idx="0">
+            <a:schemeClr val="accent1"/>
+          </a:fillRef>
+          <a:effectRef idx="0">
+            <a:schemeClr val="accent1"/>
+          </a:effectRef>
+          <a:fontRef idx="minor">
+            <a:schemeClr val="tx1"/>
+          </a:fontRef>
+        </p:style>
+        <p:txBody>
+          <a:bodyPr rtlCol="0" anchor="ctr"/>
+          <a:lstStyle/>
+          <a:p>
+            <a:pPr algn="ctr"/>
+            <a:endParaRPr lang="en-US"/>
+          </a:p>
+        </p:txBody>
+      </p:sp>
+      <p:cxnSp>
+        <p:nvCxnSpPr>
+          <p:cNvPr id="386" name="Straight Arrow Connector 385">
+            <a:extLst>
+              <a:ext uri="{FF2B5EF4-FFF2-40B4-BE49-F238E27FC236}">
+                <a16:creationId xmlns:a16="http://schemas.microsoft.com/office/drawing/2014/main" id="{AB4606FA-503C-D94D-AB82-CDC248A99957}"/>
+              </a:ext>
+            </a:extLst>
+          </p:cNvPr>
+          <p:cNvCxnSpPr>
+            <a:cxnSpLocks/>
+          </p:cNvCxnSpPr>
+          <p:nvPr/>
+        </p:nvCxnSpPr>
+        <p:spPr>
+          <a:xfrm flipH="1">
+            <a:off x="12368977" y="2766130"/>
+            <a:ext cx="305521" cy="0"/>
+          </a:xfrm>
+          <a:prstGeom prst="straightConnector1">
+            <a:avLst/>
+          </a:prstGeom>
+          <a:ln w="28575">
+            <a:solidFill>
+              <a:srgbClr val="FF0000"/>
+            </a:solidFill>
+            <a:tailEnd type="triangle"/>
           </a:ln>
         </p:spPr>
         <p:style>
@@ -14684,23 +15460,22 @@
       </p:cxnSp>
       <p:cxnSp>
         <p:nvCxnSpPr>
-          <p:cNvPr id="291" name="Straight Arrow Connector 290">
-            <a:extLst>
-              <a:ext uri="{FF2B5EF4-FFF2-40B4-BE49-F238E27FC236}">
-                <a16:creationId xmlns:a16="http://schemas.microsoft.com/office/drawing/2014/main" id="{3ADBD2F8-DE11-374A-8E47-66F4B13629AD}"/>
+          <p:cNvPr id="388" name="Straight Arrow Connector 387">
+            <a:extLst>
+              <a:ext uri="{FF2B5EF4-FFF2-40B4-BE49-F238E27FC236}">
+                <a16:creationId xmlns:a16="http://schemas.microsoft.com/office/drawing/2014/main" id="{7F12CD47-C99D-524C-B4D6-0C90D6D3C9A6}"/>
               </a:ext>
             </a:extLst>
           </p:cNvPr>
           <p:cNvCxnSpPr>
             <a:cxnSpLocks/>
-            <a:endCxn id="146" idx="1"/>
           </p:cNvCxnSpPr>
           <p:nvPr/>
         </p:nvCxnSpPr>
         <p:spPr>
           <a:xfrm flipV="1">
-            <a:off x="15288344" y="5464295"/>
-            <a:ext cx="1283612" cy="132576"/>
+            <a:off x="12661100" y="2766130"/>
+            <a:ext cx="0" cy="383414"/>
           </a:xfrm>
           <a:prstGeom prst="straightConnector1">
             <a:avLst/>
@@ -14710,7 +15485,7 @@
               <a:srgbClr val="FF0000"/>
             </a:solidFill>
             <a:headEnd type="none" w="med" len="med"/>
-            <a:tailEnd type="triangle" w="med" len="med"/>
+            <a:tailEnd type="none" w="med" len="med"/>
           </a:ln>
         </p:spPr>
         <p:style>
@@ -14730,10 +15505,10 @@
       </p:cxnSp>
       <p:cxnSp>
         <p:nvCxnSpPr>
-          <p:cNvPr id="292" name="Straight Arrow Connector 291">
-            <a:extLst>
-              <a:ext uri="{FF2B5EF4-FFF2-40B4-BE49-F238E27FC236}">
-                <a16:creationId xmlns:a16="http://schemas.microsoft.com/office/drawing/2014/main" id="{98F99F63-FAE8-2346-BF50-CA9DD3FC28A3}"/>
+          <p:cNvPr id="390" name="Straight Arrow Connector 389">
+            <a:extLst>
+              <a:ext uri="{FF2B5EF4-FFF2-40B4-BE49-F238E27FC236}">
+                <a16:creationId xmlns:a16="http://schemas.microsoft.com/office/drawing/2014/main" id="{DDFFC6B3-A223-D045-82E5-2EE6A976A8C0}"/>
               </a:ext>
             </a:extLst>
           </p:cNvPr>
@@ -14743,9 +15518,9 @@
           <p:nvPr/>
         </p:nvCxnSpPr>
         <p:spPr>
-          <a:xfrm flipV="1">
-            <a:off x="17364722" y="4562632"/>
-            <a:ext cx="1988728" cy="977034"/>
+          <a:xfrm flipH="1">
+            <a:off x="11663574" y="3149541"/>
+            <a:ext cx="1010924" cy="0"/>
           </a:xfrm>
           <a:prstGeom prst="straightConnector1">
             <a:avLst/>
@@ -14775,33 +15550,34 @@
       </p:cxnSp>
       <p:cxnSp>
         <p:nvCxnSpPr>
-          <p:cNvPr id="298" name="Straight Arrow Connector 265">
-            <a:extLst>
-              <a:ext uri="{FF2B5EF4-FFF2-40B4-BE49-F238E27FC236}">
-                <a16:creationId xmlns:a16="http://schemas.microsoft.com/office/drawing/2014/main" id="{F4A7DA0E-AC3E-FC46-8BD5-0AD40EE9AA4C}"/>
+          <p:cNvPr id="397" name="Straight Arrow Connector 396">
+            <a:extLst>
+              <a:ext uri="{FF2B5EF4-FFF2-40B4-BE49-F238E27FC236}">
+                <a16:creationId xmlns:a16="http://schemas.microsoft.com/office/drawing/2014/main" id="{25D7E5E3-D241-4A4E-9AB3-51ADE7C6EBAA}"/>
               </a:ext>
             </a:extLst>
           </p:cNvPr>
           <p:cNvCxnSpPr>
             <a:cxnSpLocks/>
+            <a:endCxn id="396" idx="1"/>
           </p:cNvCxnSpPr>
           <p:nvPr/>
         </p:nvCxnSpPr>
         <p:spPr>
           <a:xfrm>
-            <a:off x="20187053" y="4524239"/>
-            <a:ext cx="263184" cy="166040"/>
-          </a:xfrm>
-          <a:prstGeom prst="bentConnector3">
-            <a:avLst>
-              <a:gd name="adj1" fmla="val 98480"/>
-            </a:avLst>
-          </a:prstGeom>
-          <a:ln w="28575">
-            <a:solidFill>
-              <a:srgbClr val="FF0000"/>
-            </a:solidFill>
-            <a:tailEnd type="triangle"/>
+            <a:off x="13709100" y="4065228"/>
+            <a:ext cx="298729" cy="3900"/>
+          </a:xfrm>
+          <a:prstGeom prst="straightConnector1">
+            <a:avLst/>
+          </a:prstGeom>
+          <a:ln>
+            <a:solidFill>
+              <a:schemeClr val="tx1"/>
+            </a:solidFill>
+            <a:prstDash val="sysDash"/>
+            <a:headEnd type="none" w="med" len="med"/>
+            <a:tailEnd type="none" w="med" len="med"/>
           </a:ln>
         </p:spPr>
         <p:style>
@@ -14819,12 +15595,129 @@
           </a:fontRef>
         </p:style>
       </p:cxnSp>
+      <p:sp>
+        <p:nvSpPr>
+          <p:cNvPr id="358" name="TextBox 357">
+            <a:extLst>
+              <a:ext uri="{FF2B5EF4-FFF2-40B4-BE49-F238E27FC236}">
+                <a16:creationId xmlns:a16="http://schemas.microsoft.com/office/drawing/2014/main" id="{DAEF3363-0AF4-D44E-8A97-56314637535A}"/>
+              </a:ext>
+            </a:extLst>
+          </p:cNvPr>
+          <p:cNvSpPr txBox="1"/>
+          <p:nvPr/>
+        </p:nvSpPr>
+        <p:spPr>
+          <a:xfrm>
+            <a:off x="24936217" y="739794"/>
+            <a:ext cx="1006348" cy="253916"/>
+          </a:xfrm>
+          <a:prstGeom prst="rect">
+            <a:avLst/>
+          </a:prstGeom>
+          <a:noFill/>
+          <a:ln>
+            <a:noFill/>
+            <a:prstDash val="sysDash"/>
+          </a:ln>
+        </p:spPr>
+        <p:txBody>
+          <a:bodyPr wrap="square" rtlCol="0">
+            <a:spAutoFit/>
+          </a:bodyPr>
+          <a:lstStyle/>
+          <a:p>
+            <a:r>
+              <a:rPr lang="en-US" sz="1050" b="1" dirty="0"/>
+              <a:t>Sending path</a:t>
+            </a:r>
+          </a:p>
+        </p:txBody>
+      </p:sp>
+      <p:sp>
+        <p:nvSpPr>
+          <p:cNvPr id="359" name="TextBox 358">
+            <a:extLst>
+              <a:ext uri="{FF2B5EF4-FFF2-40B4-BE49-F238E27FC236}">
+                <a16:creationId xmlns:a16="http://schemas.microsoft.com/office/drawing/2014/main" id="{F5A6987B-F7C2-6849-A68E-0E53C01AF98F}"/>
+              </a:ext>
+            </a:extLst>
+          </p:cNvPr>
+          <p:cNvSpPr txBox="1"/>
+          <p:nvPr/>
+        </p:nvSpPr>
+        <p:spPr>
+          <a:xfrm>
+            <a:off x="24928361" y="965777"/>
+            <a:ext cx="1006348" cy="253916"/>
+          </a:xfrm>
+          <a:prstGeom prst="rect">
+            <a:avLst/>
+          </a:prstGeom>
+          <a:noFill/>
+          <a:ln>
+            <a:noFill/>
+            <a:prstDash val="sysDash"/>
+          </a:ln>
+        </p:spPr>
+        <p:txBody>
+          <a:bodyPr wrap="square" rtlCol="0">
+            <a:spAutoFit/>
+          </a:bodyPr>
+          <a:lstStyle/>
+          <a:p>
+            <a:r>
+              <a:rPr lang="en-US" sz="1050" b="1" dirty="0"/>
+              <a:t>Receiving path</a:t>
+            </a:r>
+          </a:p>
+        </p:txBody>
+      </p:sp>
+      <p:sp>
+        <p:nvSpPr>
+          <p:cNvPr id="360" name="TextBox 359">
+            <a:extLst>
+              <a:ext uri="{FF2B5EF4-FFF2-40B4-BE49-F238E27FC236}">
+                <a16:creationId xmlns:a16="http://schemas.microsoft.com/office/drawing/2014/main" id="{4CE1988D-2C21-2241-995A-936D7B0E0051}"/>
+              </a:ext>
+            </a:extLst>
+          </p:cNvPr>
+          <p:cNvSpPr txBox="1"/>
+          <p:nvPr/>
+        </p:nvSpPr>
+        <p:spPr>
+          <a:xfrm>
+            <a:off x="24937788" y="1212186"/>
+            <a:ext cx="1506012" cy="253916"/>
+          </a:xfrm>
+          <a:prstGeom prst="rect">
+            <a:avLst/>
+          </a:prstGeom>
+          <a:noFill/>
+          <a:ln>
+            <a:noFill/>
+            <a:prstDash val="sysDash"/>
+          </a:ln>
+        </p:spPr>
+        <p:txBody>
+          <a:bodyPr wrap="square" rtlCol="0">
+            <a:spAutoFit/>
+          </a:bodyPr>
+          <a:lstStyle/>
+          <a:p>
+            <a:r>
+              <a:rPr lang="en-US" sz="1050" b="1" dirty="0"/>
+              <a:t>Message delivery path</a:t>
+            </a:r>
+          </a:p>
+        </p:txBody>
+      </p:sp>
       <p:cxnSp>
         <p:nvCxnSpPr>
-          <p:cNvPr id="316" name="Straight Arrow Connector 315">
-            <a:extLst>
-              <a:ext uri="{FF2B5EF4-FFF2-40B4-BE49-F238E27FC236}">
-                <a16:creationId xmlns:a16="http://schemas.microsoft.com/office/drawing/2014/main" id="{F4FB71F4-22E4-9346-B72F-95F6C9B85DF9}"/>
+          <p:cNvPr id="79" name="Straight Arrow Connector 78">
+            <a:extLst>
+              <a:ext uri="{FF2B5EF4-FFF2-40B4-BE49-F238E27FC236}">
+                <a16:creationId xmlns:a16="http://schemas.microsoft.com/office/drawing/2014/main" id="{244A9E54-D66D-F249-A0A1-6A6B2E41E9AD}"/>
               </a:ext>
             </a:extLst>
           </p:cNvPr>
@@ -14834,9 +15727,9 @@
           <p:nvPr/>
         </p:nvCxnSpPr>
         <p:spPr>
-          <a:xfrm flipV="1">
-            <a:off x="20545155" y="3985244"/>
-            <a:ext cx="1499104" cy="739178"/>
+          <a:xfrm flipH="1" flipV="1">
+            <a:off x="3267214" y="3038134"/>
+            <a:ext cx="921949" cy="500095"/>
           </a:xfrm>
           <a:prstGeom prst="straightConnector1">
             <a:avLst/>
@@ -14845,8 +15738,7 @@
             <a:solidFill>
               <a:srgbClr val="FF0000"/>
             </a:solidFill>
-            <a:headEnd type="none" w="med" len="med"/>
-            <a:tailEnd type="triangle" w="med" len="med"/>
+            <a:tailEnd type="triangle"/>
           </a:ln>
         </p:spPr>
         <p:style>
@@ -14866,10 +15758,10 @@
       </p:cxnSp>
       <p:sp>
         <p:nvSpPr>
-          <p:cNvPr id="321" name="U-turn Arrow 320">
-            <a:extLst>
-              <a:ext uri="{FF2B5EF4-FFF2-40B4-BE49-F238E27FC236}">
-                <a16:creationId xmlns:a16="http://schemas.microsoft.com/office/drawing/2014/main" id="{5805E2E1-451D-CE46-BF8C-C9BA5AA878A2}"/>
+          <p:cNvPr id="166" name="U-turn Arrow 165">
+            <a:extLst>
+              <a:ext uri="{FF2B5EF4-FFF2-40B4-BE49-F238E27FC236}">
+                <a16:creationId xmlns:a16="http://schemas.microsoft.com/office/drawing/2014/main" id="{A276D138-1A27-3349-9C07-40A8649584A3}"/>
               </a:ext>
             </a:extLst>
           </p:cNvPr>
@@ -14877,21 +15769,21 @@
           <p:nvPr/>
         </p:nvSpPr>
         <p:spPr>
-          <a:xfrm rot="5400000">
-            <a:off x="23072058" y="3761715"/>
-            <a:ext cx="389465" cy="903542"/>
+          <a:xfrm rot="16200000" flipV="1">
+            <a:off x="15020344" y="2028202"/>
+            <a:ext cx="220961" cy="1605853"/>
           </a:xfrm>
           <a:prstGeom prst="uturnArrow">
             <a:avLst>
               <a:gd name="adj1" fmla="val 0"/>
-              <a:gd name="adj2" fmla="val 6434"/>
-              <a:gd name="adj3" fmla="val 8568"/>
+              <a:gd name="adj2" fmla="val 9999"/>
+              <a:gd name="adj3" fmla="val 22709"/>
               <a:gd name="adj4" fmla="val 0"/>
-              <a:gd name="adj5" fmla="val 63582"/>
+              <a:gd name="adj5" fmla="val 15907"/>
             </a:avLst>
           </a:prstGeom>
           <a:solidFill>
-            <a:schemeClr val="accent1"/>
+            <a:srgbClr val="FF0000"/>
           </a:solidFill>
           <a:ln w="28575">
             <a:solidFill>
@@ -14930,10 +15822,135 @@
       </p:sp>
       <p:sp>
         <p:nvSpPr>
-          <p:cNvPr id="166" name="TextBox 165">
-            <a:extLst>
-              <a:ext uri="{FF2B5EF4-FFF2-40B4-BE49-F238E27FC236}">
-                <a16:creationId xmlns:a16="http://schemas.microsoft.com/office/drawing/2014/main" id="{0F3C666C-EBA7-C640-9D8C-4E69FC748CFC}"/>
+          <p:cNvPr id="167" name="U-turn Arrow 166">
+            <a:extLst>
+              <a:ext uri="{FF2B5EF4-FFF2-40B4-BE49-F238E27FC236}">
+                <a16:creationId xmlns:a16="http://schemas.microsoft.com/office/drawing/2014/main" id="{CCC29ED5-E7D3-8249-9020-4E6070C60B43}"/>
+              </a:ext>
+            </a:extLst>
+          </p:cNvPr>
+          <p:cNvSpPr/>
+          <p:nvPr/>
+        </p:nvSpPr>
+        <p:spPr>
+          <a:xfrm rot="5400000" flipH="1" flipV="1">
+            <a:off x="12895787" y="2359441"/>
+            <a:ext cx="401827" cy="391785"/>
+          </a:xfrm>
+          <a:prstGeom prst="uturnArrow">
+            <a:avLst>
+              <a:gd name="adj1" fmla="val 0"/>
+              <a:gd name="adj2" fmla="val 9999"/>
+              <a:gd name="adj3" fmla="val 13864"/>
+              <a:gd name="adj4" fmla="val 0"/>
+              <a:gd name="adj5" fmla="val 100000"/>
+            </a:avLst>
+          </a:prstGeom>
+          <a:solidFill>
+            <a:srgbClr val="FF0000"/>
+          </a:solidFill>
+          <a:ln w="28575">
+            <a:solidFill>
+              <a:srgbClr val="FF0000"/>
+            </a:solidFill>
+          </a:ln>
+        </p:spPr>
+        <p:style>
+          <a:lnRef idx="2">
+            <a:schemeClr val="accent1">
+              <a:shade val="50000"/>
+            </a:schemeClr>
+          </a:lnRef>
+          <a:fillRef idx="1">
+            <a:schemeClr val="accent1"/>
+          </a:fillRef>
+          <a:effectRef idx="0">
+            <a:schemeClr val="accent1"/>
+          </a:effectRef>
+          <a:fontRef idx="minor">
+            <a:schemeClr val="lt1"/>
+          </a:fontRef>
+        </p:style>
+        <p:txBody>
+          <a:bodyPr rtlCol="0" anchor="ctr"/>
+          <a:lstStyle/>
+          <a:p>
+            <a:pPr algn="ctr"/>
+            <a:endParaRPr lang="en-US">
+              <a:solidFill>
+                <a:schemeClr val="tx1"/>
+              </a:solidFill>
+            </a:endParaRPr>
+          </a:p>
+        </p:txBody>
+      </p:sp>
+      <p:sp>
+        <p:nvSpPr>
+          <p:cNvPr id="168" name="Rectangle 167">
+            <a:extLst>
+              <a:ext uri="{FF2B5EF4-FFF2-40B4-BE49-F238E27FC236}">
+                <a16:creationId xmlns:a16="http://schemas.microsoft.com/office/drawing/2014/main" id="{CA2783F5-C08E-EF4E-8DA7-955B5B17CB77}"/>
+              </a:ext>
+            </a:extLst>
+          </p:cNvPr>
+          <p:cNvSpPr/>
+          <p:nvPr/>
+        </p:nvSpPr>
+        <p:spPr>
+          <a:xfrm>
+            <a:off x="15982783" y="1678231"/>
+            <a:ext cx="1930982" cy="1025482"/>
+          </a:xfrm>
+          <a:prstGeom prst="rect">
+            <a:avLst/>
+          </a:prstGeom>
+          <a:solidFill>
+            <a:schemeClr val="accent6">
+              <a:lumMod val="20000"/>
+              <a:lumOff val="80000"/>
+            </a:schemeClr>
+          </a:solidFill>
+          <a:ln w="28575">
+            <a:solidFill>
+              <a:schemeClr val="accent6">
+                <a:lumMod val="50000"/>
+              </a:schemeClr>
+            </a:solidFill>
+            <a:headEnd type="triangle" w="med" len="med"/>
+            <a:tailEnd type="none" w="med" len="med"/>
+          </a:ln>
+        </p:spPr>
+        <p:style>
+          <a:lnRef idx="2">
+            <a:schemeClr val="accent1">
+              <a:shade val="50000"/>
+            </a:schemeClr>
+          </a:lnRef>
+          <a:fillRef idx="1">
+            <a:schemeClr val="accent1"/>
+          </a:fillRef>
+          <a:effectRef idx="0">
+            <a:schemeClr val="accent1"/>
+          </a:effectRef>
+          <a:fontRef idx="minor">
+            <a:schemeClr val="lt1"/>
+          </a:fontRef>
+        </p:style>
+        <p:txBody>
+          <a:bodyPr rtlCol="0" anchor="ctr"/>
+          <a:lstStyle/>
+          <a:p>
+            <a:pPr algn="ctr"/>
+            <a:endParaRPr lang="en-US"/>
+          </a:p>
+        </p:txBody>
+      </p:sp>
+      <p:sp>
+        <p:nvSpPr>
+          <p:cNvPr id="176" name="TextBox 175">
+            <a:extLst>
+              <a:ext uri="{FF2B5EF4-FFF2-40B4-BE49-F238E27FC236}">
+                <a16:creationId xmlns:a16="http://schemas.microsoft.com/office/drawing/2014/main" id="{25E1BCB2-4574-B64B-904E-CF342B5FC372}"/>
               </a:ext>
             </a:extLst>
           </p:cNvPr>
@@ -14942,7 +15959,117 @@
         </p:nvSpPr>
         <p:spPr>
           <a:xfrm>
-            <a:off x="18126836" y="3363685"/>
+            <a:off x="15982783" y="1681113"/>
+            <a:ext cx="1930982" cy="1015663"/>
+          </a:xfrm>
+          <a:prstGeom prst="rect">
+            <a:avLst/>
+          </a:prstGeom>
+          <a:noFill/>
+          <a:ln>
+            <a:solidFill>
+              <a:schemeClr val="tx1"/>
+            </a:solidFill>
+            <a:headEnd type="triangle" w="med" len="med"/>
+            <a:tailEnd type="none" w="med" len="med"/>
+          </a:ln>
+        </p:spPr>
+        <p:txBody>
+          <a:bodyPr wrap="square" rtlCol="0">
+            <a:spAutoFit/>
+          </a:bodyPr>
+          <a:lstStyle/>
+          <a:p>
+            <a:pPr algn="ctr"/>
+            <a:r>
+              <a:rPr lang="en-US" sz="1200" b="1" dirty="0"/>
+              <a:t>FlowSessionImpl</a:t>
+            </a:r>
+          </a:p>
+          <a:p>
+            <a:pPr algn="ctr"/>
+            <a:endParaRPr lang="en-US" sz="1200" b="1" dirty="0"/>
+          </a:p>
+          <a:p>
+            <a:r>
+              <a:rPr lang="en-US" sz="1200" dirty="0"/>
+              <a:t>flowStateMachine</a:t>
+            </a:r>
+          </a:p>
+          <a:p>
+            <a:r>
+              <a:rPr lang="en-US" sz="1200" dirty="0"/>
+              <a:t>send()</a:t>
+            </a:r>
+          </a:p>
+          <a:p>
+            <a:r>
+              <a:rPr lang="en-US" sz="1200" dirty="0"/>
+              <a:t>receive()</a:t>
+            </a:r>
+          </a:p>
+        </p:txBody>
+      </p:sp>
+      <p:cxnSp>
+        <p:nvCxnSpPr>
+          <p:cNvPr id="177" name="Straight Arrow Connector 176">
+            <a:extLst>
+              <a:ext uri="{FF2B5EF4-FFF2-40B4-BE49-F238E27FC236}">
+                <a16:creationId xmlns:a16="http://schemas.microsoft.com/office/drawing/2014/main" id="{B6364431-580B-C743-A4BB-6EDE6F4C613C}"/>
+              </a:ext>
+            </a:extLst>
+          </p:cNvPr>
+          <p:cNvCxnSpPr>
+            <a:cxnSpLocks/>
+          </p:cNvCxnSpPr>
+          <p:nvPr/>
+        </p:nvCxnSpPr>
+        <p:spPr>
+          <a:xfrm flipH="1">
+            <a:off x="14015010" y="2354420"/>
+            <a:ext cx="1967771" cy="13367"/>
+          </a:xfrm>
+          <a:prstGeom prst="straightConnector1">
+            <a:avLst/>
+          </a:prstGeom>
+          <a:ln w="28575">
+            <a:solidFill>
+              <a:srgbClr val="FF0000"/>
+            </a:solidFill>
+            <a:headEnd type="triangle" w="med" len="med"/>
+            <a:tailEnd type="none" w="med" len="med"/>
+          </a:ln>
+        </p:spPr>
+        <p:style>
+          <a:lnRef idx="1">
+            <a:schemeClr val="accent1"/>
+          </a:lnRef>
+          <a:fillRef idx="0">
+            <a:schemeClr val="accent1"/>
+          </a:fillRef>
+          <a:effectRef idx="0">
+            <a:schemeClr val="accent1"/>
+          </a:effectRef>
+          <a:fontRef idx="minor">
+            <a:schemeClr val="tx1"/>
+          </a:fontRef>
+        </p:style>
+      </p:cxnSp>
+      <p:sp>
+        <p:nvSpPr>
+          <p:cNvPr id="184" name="TextBox 183">
+            <a:extLst>
+              <a:ext uri="{FF2B5EF4-FFF2-40B4-BE49-F238E27FC236}">
+                <a16:creationId xmlns:a16="http://schemas.microsoft.com/office/drawing/2014/main" id="{E412FDA8-0E15-8D48-8E3B-728701898698}"/>
+              </a:ext>
+            </a:extLst>
+          </p:cNvPr>
+          <p:cNvSpPr txBox="1"/>
+          <p:nvPr/>
+        </p:nvSpPr>
+        <p:spPr>
+          <a:xfrm>
+            <a:off x="13607735" y="3275384"/>
             <a:ext cx="232250" cy="276999"/>
           </a:xfrm>
           <a:prstGeom prst="rect">
@@ -14976,10 +16103,10 @@
       </p:sp>
       <p:sp>
         <p:nvSpPr>
-          <p:cNvPr id="167" name="TextBox 166">
-            <a:extLst>
-              <a:ext uri="{FF2B5EF4-FFF2-40B4-BE49-F238E27FC236}">
-                <a16:creationId xmlns:a16="http://schemas.microsoft.com/office/drawing/2014/main" id="{D85929F8-DE20-9141-9FEE-C618F2E5DDE5}"/>
+          <p:cNvPr id="186" name="TextBox 185">
+            <a:extLst>
+              <a:ext uri="{FF2B5EF4-FFF2-40B4-BE49-F238E27FC236}">
+                <a16:creationId xmlns:a16="http://schemas.microsoft.com/office/drawing/2014/main" id="{81E15E83-18D0-C144-B95E-E48D36A2E053}"/>
               </a:ext>
             </a:extLst>
           </p:cNvPr>
@@ -14988,7 +16115,53 @@
         </p:nvSpPr>
         <p:spPr>
           <a:xfrm>
-            <a:off x="14165932" y="4123822"/>
+            <a:off x="9998709" y="2810832"/>
+            <a:ext cx="232250" cy="276999"/>
+          </a:xfrm>
+          <a:prstGeom prst="rect">
+            <a:avLst/>
+          </a:prstGeom>
+          <a:solidFill>
+            <a:schemeClr val="bg1"/>
+          </a:solidFill>
+          <a:ln w="38100">
+            <a:solidFill>
+              <a:srgbClr val="FF0000"/>
+            </a:solidFill>
+          </a:ln>
+        </p:spPr>
+        <p:txBody>
+          <a:bodyPr wrap="square" rtlCol="0">
+            <a:spAutoFit/>
+          </a:bodyPr>
+          <a:lstStyle/>
+          <a:p>
+            <a:r>
+              <a:rPr lang="en-US" sz="1200" b="1" dirty="0">
+                <a:solidFill>
+                  <a:srgbClr val="FF0000"/>
+                </a:solidFill>
+              </a:rPr>
+              <a:t>2</a:t>
+            </a:r>
+          </a:p>
+        </p:txBody>
+      </p:sp>
+      <p:sp>
+        <p:nvSpPr>
+          <p:cNvPr id="193" name="TextBox 192">
+            <a:extLst>
+              <a:ext uri="{FF2B5EF4-FFF2-40B4-BE49-F238E27FC236}">
+                <a16:creationId xmlns:a16="http://schemas.microsoft.com/office/drawing/2014/main" id="{2DF7AB80-0B51-3B40-8D6D-E5A0417E0600}"/>
+              </a:ext>
+            </a:extLst>
+          </p:cNvPr>
+          <p:cNvSpPr txBox="1"/>
+          <p:nvPr/>
+        </p:nvSpPr>
+        <p:spPr>
+          <a:xfrm>
+            <a:off x="5668752" y="3544750"/>
             <a:ext cx="232250" cy="276999"/>
           </a:xfrm>
           <a:prstGeom prst="rect">
@@ -15022,10 +16195,10 @@
       </p:sp>
       <p:sp>
         <p:nvSpPr>
-          <p:cNvPr id="168" name="TextBox 167">
-            <a:extLst>
-              <a:ext uri="{FF2B5EF4-FFF2-40B4-BE49-F238E27FC236}">
-                <a16:creationId xmlns:a16="http://schemas.microsoft.com/office/drawing/2014/main" id="{97C84D8E-D2C7-A04A-BF35-0325C4DBFD08}"/>
+          <p:cNvPr id="196" name="TextBox 195">
+            <a:extLst>
+              <a:ext uri="{FF2B5EF4-FFF2-40B4-BE49-F238E27FC236}">
+                <a16:creationId xmlns:a16="http://schemas.microsoft.com/office/drawing/2014/main" id="{9219165E-5155-BC42-8493-2D52396F47CE}"/>
               </a:ext>
             </a:extLst>
           </p:cNvPr>
@@ -15034,7 +16207,7 @@
         </p:nvSpPr>
         <p:spPr>
           <a:xfrm>
-            <a:off x="23372189" y="4189688"/>
+            <a:off x="15259132" y="2192541"/>
             <a:ext cx="232250" cy="276999"/>
           </a:xfrm>
           <a:prstGeom prst="rect">
@@ -15066,56 +16239,10 @@
           </a:p>
         </p:txBody>
       </p:sp>
-      <p:sp>
-        <p:nvSpPr>
-          <p:cNvPr id="176" name="TextBox 175">
-            <a:extLst>
-              <a:ext uri="{FF2B5EF4-FFF2-40B4-BE49-F238E27FC236}">
-                <a16:creationId xmlns:a16="http://schemas.microsoft.com/office/drawing/2014/main" id="{BF4EE261-2E65-7A44-A19F-BFCB6B83F347}"/>
-              </a:ext>
-            </a:extLst>
-          </p:cNvPr>
-          <p:cNvSpPr txBox="1"/>
-          <p:nvPr/>
-        </p:nvSpPr>
-        <p:spPr>
-          <a:xfrm>
-            <a:off x="15091866" y="2892702"/>
-            <a:ext cx="232250" cy="276999"/>
-          </a:xfrm>
-          <a:prstGeom prst="rect">
-            <a:avLst/>
-          </a:prstGeom>
-          <a:solidFill>
-            <a:schemeClr val="bg1"/>
-          </a:solidFill>
-          <a:ln w="38100">
-            <a:solidFill>
-              <a:srgbClr val="FF0000"/>
-            </a:solidFill>
-          </a:ln>
-        </p:spPr>
-        <p:txBody>
-          <a:bodyPr wrap="square" rtlCol="0">
-            <a:spAutoFit/>
-          </a:bodyPr>
-          <a:lstStyle/>
-          <a:p>
-            <a:r>
-              <a:rPr lang="en-US" sz="1200" b="1" dirty="0">
-                <a:solidFill>
-                  <a:srgbClr val="FF0000"/>
-                </a:solidFill>
-              </a:rPr>
-              <a:t>2</a:t>
-            </a:r>
-          </a:p>
-        </p:txBody>
-      </p:sp>
     </p:spTree>
     <p:extLst>
       <p:ext uri="{BB962C8B-B14F-4D97-AF65-F5344CB8AC3E}">
-        <p14:creationId xmlns:p14="http://schemas.microsoft.com/office/powerpoint/2010/main" val="151098243"/>
+        <p14:creationId xmlns:p14="http://schemas.microsoft.com/office/powerpoint/2010/main" val="4172997720"/>
       </p:ext>
     </p:extLst>
   </p:cSld>
@@ -15156,6 +16283,1699 @@
         </p:nvSpPr>
         <p:spPr>
           <a:xfrm rot="16200000" flipH="1">
+            <a:off x="13175439" y="2158766"/>
+            <a:ext cx="395800" cy="767522"/>
+          </a:xfrm>
+          <a:prstGeom prst="uturnArrow">
+            <a:avLst>
+              <a:gd name="adj1" fmla="val 0"/>
+              <a:gd name="adj2" fmla="val 4765"/>
+              <a:gd name="adj3" fmla="val 8630"/>
+              <a:gd name="adj4" fmla="val 0"/>
+              <a:gd name="adj5" fmla="val 100000"/>
+            </a:avLst>
+          </a:prstGeom>
+          <a:solidFill>
+            <a:srgbClr val="FF0000"/>
+          </a:solidFill>
+          <a:ln w="28575">
+            <a:solidFill>
+              <a:srgbClr val="FF0000"/>
+            </a:solidFill>
+          </a:ln>
+        </p:spPr>
+        <p:style>
+          <a:lnRef idx="2">
+            <a:schemeClr val="accent1">
+              <a:shade val="50000"/>
+            </a:schemeClr>
+          </a:lnRef>
+          <a:fillRef idx="1">
+            <a:schemeClr val="accent1"/>
+          </a:fillRef>
+          <a:effectRef idx="0">
+            <a:schemeClr val="accent1"/>
+          </a:effectRef>
+          <a:fontRef idx="minor">
+            <a:schemeClr val="lt1"/>
+          </a:fontRef>
+        </p:style>
+        <p:txBody>
+          <a:bodyPr rtlCol="0" anchor="ctr"/>
+          <a:lstStyle/>
+          <a:p>
+            <a:pPr algn="ctr"/>
+            <a:endParaRPr lang="en-US">
+              <a:solidFill>
+                <a:schemeClr val="tx1"/>
+              </a:solidFill>
+            </a:endParaRPr>
+          </a:p>
+        </p:txBody>
+      </p:sp>
+      <p:sp>
+        <p:nvSpPr>
+          <p:cNvPr id="282" name="TextBox 281">
+            <a:extLst>
+              <a:ext uri="{FF2B5EF4-FFF2-40B4-BE49-F238E27FC236}">
+                <a16:creationId xmlns:a16="http://schemas.microsoft.com/office/drawing/2014/main" id="{678AC224-495C-5C43-868C-3BA2B399D618}"/>
+              </a:ext>
+            </a:extLst>
+          </p:cNvPr>
+          <p:cNvSpPr txBox="1"/>
+          <p:nvPr/>
+        </p:nvSpPr>
+        <p:spPr>
+          <a:xfrm>
+            <a:off x="13798312" y="1860020"/>
+            <a:ext cx="2431289" cy="1200329"/>
+          </a:xfrm>
+          <a:prstGeom prst="rect">
+            <a:avLst/>
+          </a:prstGeom>
+          <a:noFill/>
+        </p:spPr>
+        <p:txBody>
+          <a:bodyPr wrap="square" rtlCol="0">
+            <a:spAutoFit/>
+          </a:bodyPr>
+          <a:lstStyle/>
+          <a:p>
+            <a:pPr algn="ctr"/>
+            <a:r>
+              <a:rPr lang="en-US" sz="1200" b="1" dirty="0"/>
+              <a:t>FlowStateMachineImpl</a:t>
+            </a:r>
+          </a:p>
+          <a:p>
+            <a:pPr algn="ctr"/>
+            <a:endParaRPr lang="en-US" sz="1200" b="1" dirty="0"/>
+          </a:p>
+          <a:p>
+            <a:r>
+              <a:rPr lang="en-US" sz="1200" dirty="0"/>
+              <a:t>suspend()</a:t>
+            </a:r>
+          </a:p>
+          <a:p>
+            <a:r>
+              <a:rPr lang="en-US" sz="1200" dirty="0"/>
+              <a:t>scheduleEvent()</a:t>
+            </a:r>
+          </a:p>
+          <a:p>
+            <a:r>
+              <a:rPr lang="en-US" sz="1200" dirty="0"/>
+              <a:t>processEventsUntilFlowIsResumed()</a:t>
+            </a:r>
+          </a:p>
+          <a:p>
+            <a:r>
+              <a:rPr lang="en-US" sz="1200" dirty="0"/>
+              <a:t>processEvent()</a:t>
+            </a:r>
+          </a:p>
+        </p:txBody>
+      </p:sp>
+      <p:sp>
+        <p:nvSpPr>
+          <p:cNvPr id="281" name="Rectangle 280">
+            <a:extLst>
+              <a:ext uri="{FF2B5EF4-FFF2-40B4-BE49-F238E27FC236}">
+                <a16:creationId xmlns:a16="http://schemas.microsoft.com/office/drawing/2014/main" id="{B0B8E156-8950-4A49-970A-34E12F2DAC6E}"/>
+              </a:ext>
+            </a:extLst>
+          </p:cNvPr>
+          <p:cNvSpPr/>
+          <p:nvPr/>
+        </p:nvSpPr>
+        <p:spPr>
+          <a:xfrm>
+            <a:off x="13802974" y="1850199"/>
+            <a:ext cx="2426629" cy="1182852"/>
+          </a:xfrm>
+          <a:prstGeom prst="rect">
+            <a:avLst/>
+          </a:prstGeom>
+          <a:noFill/>
+          <a:ln>
+            <a:solidFill>
+              <a:schemeClr val="tx1"/>
+            </a:solidFill>
+          </a:ln>
+        </p:spPr>
+        <p:style>
+          <a:lnRef idx="2">
+            <a:schemeClr val="accent1">
+              <a:shade val="50000"/>
+            </a:schemeClr>
+          </a:lnRef>
+          <a:fillRef idx="1">
+            <a:schemeClr val="accent1"/>
+          </a:fillRef>
+          <a:effectRef idx="0">
+            <a:schemeClr val="accent1"/>
+          </a:effectRef>
+          <a:fontRef idx="minor">
+            <a:schemeClr val="lt1"/>
+          </a:fontRef>
+        </p:style>
+        <p:txBody>
+          <a:bodyPr rtlCol="0" anchor="ctr"/>
+          <a:lstStyle/>
+          <a:p>
+            <a:pPr algn="ctr"/>
+            <a:endParaRPr lang="en-US"/>
+          </a:p>
+        </p:txBody>
+      </p:sp>
+      <p:sp>
+        <p:nvSpPr>
+          <p:cNvPr id="283" name="Rectangle 282">
+            <a:extLst>
+              <a:ext uri="{FF2B5EF4-FFF2-40B4-BE49-F238E27FC236}">
+                <a16:creationId xmlns:a16="http://schemas.microsoft.com/office/drawing/2014/main" id="{ECD92F49-DA58-D246-9003-ADF945763F15}"/>
+              </a:ext>
+            </a:extLst>
+          </p:cNvPr>
+          <p:cNvSpPr/>
+          <p:nvPr/>
+        </p:nvSpPr>
+        <p:spPr>
+          <a:xfrm>
+            <a:off x="13133205" y="631070"/>
+            <a:ext cx="575895" cy="461665"/>
+          </a:xfrm>
+          <a:prstGeom prst="rect">
+            <a:avLst/>
+          </a:prstGeom>
+          <a:noFill/>
+          <a:ln>
+            <a:solidFill>
+              <a:schemeClr val="tx1"/>
+            </a:solidFill>
+          </a:ln>
+        </p:spPr>
+        <p:style>
+          <a:lnRef idx="2">
+            <a:schemeClr val="accent1">
+              <a:shade val="50000"/>
+            </a:schemeClr>
+          </a:lnRef>
+          <a:fillRef idx="1">
+            <a:schemeClr val="accent1"/>
+          </a:fillRef>
+          <a:effectRef idx="0">
+            <a:schemeClr val="accent1"/>
+          </a:effectRef>
+          <a:fontRef idx="minor">
+            <a:schemeClr val="lt1"/>
+          </a:fontRef>
+        </p:style>
+        <p:txBody>
+          <a:bodyPr rtlCol="0" anchor="ctr"/>
+          <a:lstStyle/>
+          <a:p>
+            <a:pPr algn="ctr"/>
+            <a:endParaRPr lang="en-US"/>
+          </a:p>
+        </p:txBody>
+      </p:sp>
+      <p:sp>
+        <p:nvSpPr>
+          <p:cNvPr id="284" name="TextBox 283">
+            <a:extLst>
+              <a:ext uri="{FF2B5EF4-FFF2-40B4-BE49-F238E27FC236}">
+                <a16:creationId xmlns:a16="http://schemas.microsoft.com/office/drawing/2014/main" id="{944D5A21-76C1-4243-A4DA-7B175EFB05FE}"/>
+              </a:ext>
+            </a:extLst>
+          </p:cNvPr>
+          <p:cNvSpPr txBox="1"/>
+          <p:nvPr/>
+        </p:nvSpPr>
+        <p:spPr>
+          <a:xfrm>
+            <a:off x="13133205" y="723402"/>
+            <a:ext cx="575895" cy="276999"/>
+          </a:xfrm>
+          <a:prstGeom prst="rect">
+            <a:avLst/>
+          </a:prstGeom>
+          <a:noFill/>
+        </p:spPr>
+        <p:txBody>
+          <a:bodyPr wrap="square" rtlCol="0">
+            <a:spAutoFit/>
+          </a:bodyPr>
+          <a:lstStyle/>
+          <a:p>
+            <a:pPr algn="ctr"/>
+            <a:r>
+              <a:rPr lang="en-US" sz="1200" b="1" dirty="0"/>
+              <a:t>Fiber</a:t>
+            </a:r>
+          </a:p>
+        </p:txBody>
+      </p:sp>
+      <p:sp>
+        <p:nvSpPr>
+          <p:cNvPr id="285" name="Rectangle 284">
+            <a:extLst>
+              <a:ext uri="{FF2B5EF4-FFF2-40B4-BE49-F238E27FC236}">
+                <a16:creationId xmlns:a16="http://schemas.microsoft.com/office/drawing/2014/main" id="{540FE9E5-48C2-734B-A408-26FE12A96188}"/>
+              </a:ext>
+            </a:extLst>
+          </p:cNvPr>
+          <p:cNvSpPr/>
+          <p:nvPr/>
+        </p:nvSpPr>
+        <p:spPr>
+          <a:xfrm>
+            <a:off x="13900985" y="631070"/>
+            <a:ext cx="1725643" cy="461665"/>
+          </a:xfrm>
+          <a:prstGeom prst="rect">
+            <a:avLst/>
+          </a:prstGeom>
+          <a:noFill/>
+          <a:ln>
+            <a:solidFill>
+              <a:schemeClr val="tx1"/>
+            </a:solidFill>
+          </a:ln>
+        </p:spPr>
+        <p:style>
+          <a:lnRef idx="2">
+            <a:schemeClr val="accent1">
+              <a:shade val="50000"/>
+            </a:schemeClr>
+          </a:lnRef>
+          <a:fillRef idx="1">
+            <a:schemeClr val="accent1"/>
+          </a:fillRef>
+          <a:effectRef idx="0">
+            <a:schemeClr val="accent1"/>
+          </a:effectRef>
+          <a:fontRef idx="minor">
+            <a:schemeClr val="lt1"/>
+          </a:fontRef>
+        </p:style>
+        <p:txBody>
+          <a:bodyPr rtlCol="0" anchor="ctr"/>
+          <a:lstStyle/>
+          <a:p>
+            <a:pPr algn="ctr"/>
+            <a:endParaRPr lang="en-US"/>
+          </a:p>
+        </p:txBody>
+      </p:sp>
+      <p:sp>
+        <p:nvSpPr>
+          <p:cNvPr id="286" name="TextBox 285">
+            <a:extLst>
+              <a:ext uri="{FF2B5EF4-FFF2-40B4-BE49-F238E27FC236}">
+                <a16:creationId xmlns:a16="http://schemas.microsoft.com/office/drawing/2014/main" id="{A5DB5365-C15B-B145-9E40-453F24251374}"/>
+              </a:ext>
+            </a:extLst>
+          </p:cNvPr>
+          <p:cNvSpPr txBox="1"/>
+          <p:nvPr/>
+        </p:nvSpPr>
+        <p:spPr>
+          <a:xfrm>
+            <a:off x="13900981" y="631070"/>
+            <a:ext cx="1725642" cy="461665"/>
+          </a:xfrm>
+          <a:prstGeom prst="rect">
+            <a:avLst/>
+          </a:prstGeom>
+          <a:noFill/>
+        </p:spPr>
+        <p:txBody>
+          <a:bodyPr wrap="square" rtlCol="0">
+            <a:spAutoFit/>
+          </a:bodyPr>
+          <a:lstStyle/>
+          <a:p>
+            <a:pPr algn="ctr"/>
+            <a:r>
+              <a:rPr lang="en-US" sz="1200" dirty="0"/>
+              <a:t>&lt;&lt;interface&gt;&gt;</a:t>
+            </a:r>
+          </a:p>
+          <a:p>
+            <a:pPr algn="ctr"/>
+            <a:r>
+              <a:rPr lang="en-US" sz="1200" b="1" dirty="0"/>
+              <a:t>FlowStateMachine</a:t>
+            </a:r>
+          </a:p>
+        </p:txBody>
+      </p:sp>
+      <p:sp>
+        <p:nvSpPr>
+          <p:cNvPr id="287" name="Rectangle 286">
+            <a:extLst>
+              <a:ext uri="{FF2B5EF4-FFF2-40B4-BE49-F238E27FC236}">
+                <a16:creationId xmlns:a16="http://schemas.microsoft.com/office/drawing/2014/main" id="{2B527E4B-EC10-EB4D-B08F-AFAF8015C10D}"/>
+              </a:ext>
+            </a:extLst>
+          </p:cNvPr>
+          <p:cNvSpPr/>
+          <p:nvPr/>
+        </p:nvSpPr>
+        <p:spPr>
+          <a:xfrm>
+            <a:off x="15818510" y="631070"/>
+            <a:ext cx="1114933" cy="461665"/>
+          </a:xfrm>
+          <a:prstGeom prst="rect">
+            <a:avLst/>
+          </a:prstGeom>
+          <a:noFill/>
+          <a:ln>
+            <a:solidFill>
+              <a:schemeClr val="tx1"/>
+            </a:solidFill>
+          </a:ln>
+        </p:spPr>
+        <p:style>
+          <a:lnRef idx="2">
+            <a:schemeClr val="accent1">
+              <a:shade val="50000"/>
+            </a:schemeClr>
+          </a:lnRef>
+          <a:fillRef idx="1">
+            <a:schemeClr val="accent1"/>
+          </a:fillRef>
+          <a:effectRef idx="0">
+            <a:schemeClr val="accent1"/>
+          </a:effectRef>
+          <a:fontRef idx="minor">
+            <a:schemeClr val="lt1"/>
+          </a:fontRef>
+        </p:style>
+        <p:txBody>
+          <a:bodyPr rtlCol="0" anchor="ctr"/>
+          <a:lstStyle/>
+          <a:p>
+            <a:pPr algn="ctr"/>
+            <a:endParaRPr lang="en-US"/>
+          </a:p>
+        </p:txBody>
+      </p:sp>
+      <p:sp>
+        <p:nvSpPr>
+          <p:cNvPr id="288" name="TextBox 287">
+            <a:extLst>
+              <a:ext uri="{FF2B5EF4-FFF2-40B4-BE49-F238E27FC236}">
+                <a16:creationId xmlns:a16="http://schemas.microsoft.com/office/drawing/2014/main" id="{6FFDCC23-EE58-B949-9916-E498131BC73B}"/>
+              </a:ext>
+            </a:extLst>
+          </p:cNvPr>
+          <p:cNvSpPr txBox="1"/>
+          <p:nvPr/>
+        </p:nvSpPr>
+        <p:spPr>
+          <a:xfrm>
+            <a:off x="15818508" y="631070"/>
+            <a:ext cx="1114935" cy="461665"/>
+          </a:xfrm>
+          <a:prstGeom prst="rect">
+            <a:avLst/>
+          </a:prstGeom>
+          <a:noFill/>
+        </p:spPr>
+        <p:txBody>
+          <a:bodyPr wrap="square" rtlCol="0">
+            <a:spAutoFit/>
+          </a:bodyPr>
+          <a:lstStyle/>
+          <a:p>
+            <a:pPr algn="ctr"/>
+            <a:r>
+              <a:rPr lang="en-US" sz="1200" dirty="0"/>
+              <a:t>&lt;&lt;interface&gt;&gt;</a:t>
+            </a:r>
+          </a:p>
+          <a:p>
+            <a:pPr algn="ctr"/>
+            <a:r>
+              <a:rPr lang="en-US" sz="1200" b="1" dirty="0"/>
+              <a:t>FlowFiber</a:t>
+            </a:r>
+          </a:p>
+        </p:txBody>
+      </p:sp>
+      <p:cxnSp>
+        <p:nvCxnSpPr>
+          <p:cNvPr id="289" name="Straight Arrow Connector 288">
+            <a:extLst>
+              <a:ext uri="{FF2B5EF4-FFF2-40B4-BE49-F238E27FC236}">
+                <a16:creationId xmlns:a16="http://schemas.microsoft.com/office/drawing/2014/main" id="{AB7340B2-B808-C84B-BB5E-CC6CA835E4B7}"/>
+              </a:ext>
+            </a:extLst>
+          </p:cNvPr>
+          <p:cNvCxnSpPr>
+            <a:cxnSpLocks/>
+            <a:stCxn id="282" idx="0"/>
+            <a:endCxn id="286" idx="2"/>
+          </p:cNvCxnSpPr>
+          <p:nvPr/>
+        </p:nvCxnSpPr>
+        <p:spPr>
+          <a:xfrm flipH="1" flipV="1">
+            <a:off x="14763802" y="1092735"/>
+            <a:ext cx="250154" cy="767285"/>
+          </a:xfrm>
+          <a:prstGeom prst="straightConnector1">
+            <a:avLst/>
+          </a:prstGeom>
+          <a:ln>
+            <a:solidFill>
+              <a:schemeClr val="tx1"/>
+            </a:solidFill>
+            <a:prstDash val="sysDash"/>
+            <a:headEnd type="none" w="med" len="med"/>
+            <a:tailEnd type="none" w="med" len="med"/>
+          </a:ln>
+        </p:spPr>
+        <p:style>
+          <a:lnRef idx="1">
+            <a:schemeClr val="accent1"/>
+          </a:lnRef>
+          <a:fillRef idx="0">
+            <a:schemeClr val="accent1"/>
+          </a:fillRef>
+          <a:effectRef idx="0">
+            <a:schemeClr val="accent1"/>
+          </a:effectRef>
+          <a:fontRef idx="minor">
+            <a:schemeClr val="tx1"/>
+          </a:fontRef>
+        </p:style>
+      </p:cxnSp>
+      <p:cxnSp>
+        <p:nvCxnSpPr>
+          <p:cNvPr id="293" name="Straight Arrow Connector 292">
+            <a:extLst>
+              <a:ext uri="{FF2B5EF4-FFF2-40B4-BE49-F238E27FC236}">
+                <a16:creationId xmlns:a16="http://schemas.microsoft.com/office/drawing/2014/main" id="{636BCFAC-C3E2-3F49-9A5E-E0CCB1073BA0}"/>
+              </a:ext>
+            </a:extLst>
+          </p:cNvPr>
+          <p:cNvCxnSpPr>
+            <a:cxnSpLocks/>
+            <a:stCxn id="281" idx="0"/>
+            <a:endCxn id="288" idx="2"/>
+          </p:cNvCxnSpPr>
+          <p:nvPr/>
+        </p:nvCxnSpPr>
+        <p:spPr>
+          <a:xfrm flipV="1">
+            <a:off x="15016289" y="1092735"/>
+            <a:ext cx="1359687" cy="757465"/>
+          </a:xfrm>
+          <a:prstGeom prst="straightConnector1">
+            <a:avLst/>
+          </a:prstGeom>
+          <a:ln>
+            <a:solidFill>
+              <a:schemeClr val="tx1"/>
+            </a:solidFill>
+            <a:prstDash val="sysDash"/>
+            <a:headEnd type="none" w="med" len="med"/>
+            <a:tailEnd type="none" w="med" len="med"/>
+          </a:ln>
+        </p:spPr>
+        <p:style>
+          <a:lnRef idx="1">
+            <a:schemeClr val="accent1"/>
+          </a:lnRef>
+          <a:fillRef idx="0">
+            <a:schemeClr val="accent1"/>
+          </a:fillRef>
+          <a:effectRef idx="0">
+            <a:schemeClr val="accent1"/>
+          </a:effectRef>
+          <a:fontRef idx="minor">
+            <a:schemeClr val="tx1"/>
+          </a:fontRef>
+        </p:style>
+      </p:cxnSp>
+      <p:cxnSp>
+        <p:nvCxnSpPr>
+          <p:cNvPr id="296" name="Straight Arrow Connector 295">
+            <a:extLst>
+              <a:ext uri="{FF2B5EF4-FFF2-40B4-BE49-F238E27FC236}">
+                <a16:creationId xmlns:a16="http://schemas.microsoft.com/office/drawing/2014/main" id="{AF1820F7-9FFE-AD45-B276-C65E683DADB7}"/>
+              </a:ext>
+            </a:extLst>
+          </p:cNvPr>
+          <p:cNvCxnSpPr>
+            <a:cxnSpLocks/>
+            <a:stCxn id="281" idx="0"/>
+            <a:endCxn id="283" idx="2"/>
+          </p:cNvCxnSpPr>
+          <p:nvPr/>
+        </p:nvCxnSpPr>
+        <p:spPr>
+          <a:xfrm flipH="1" flipV="1">
+            <a:off x="13421152" y="1092735"/>
+            <a:ext cx="1595136" cy="757465"/>
+          </a:xfrm>
+          <a:prstGeom prst="straightConnector1">
+            <a:avLst/>
+          </a:prstGeom>
+          <a:ln>
+            <a:solidFill>
+              <a:schemeClr val="tx1"/>
+            </a:solidFill>
+            <a:prstDash val="sysDash"/>
+            <a:headEnd type="none" w="med" len="med"/>
+            <a:tailEnd type="none" w="med" len="med"/>
+          </a:ln>
+        </p:spPr>
+        <p:style>
+          <a:lnRef idx="1">
+            <a:schemeClr val="accent1"/>
+          </a:lnRef>
+          <a:fillRef idx="0">
+            <a:schemeClr val="accent1"/>
+          </a:fillRef>
+          <a:effectRef idx="0">
+            <a:schemeClr val="accent1"/>
+          </a:effectRef>
+          <a:fontRef idx="minor">
+            <a:schemeClr val="tx1"/>
+          </a:fontRef>
+        </p:style>
+      </p:cxnSp>
+      <p:sp>
+        <p:nvSpPr>
+          <p:cNvPr id="104" name="TextBox 103">
+            <a:extLst>
+              <a:ext uri="{FF2B5EF4-FFF2-40B4-BE49-F238E27FC236}">
+                <a16:creationId xmlns:a16="http://schemas.microsoft.com/office/drawing/2014/main" id="{BF507E43-9257-7E48-AED4-73318B3DB8BE}"/>
+              </a:ext>
+            </a:extLst>
+          </p:cNvPr>
+          <p:cNvSpPr txBox="1"/>
+          <p:nvPr/>
+        </p:nvSpPr>
+        <p:spPr>
+          <a:xfrm>
+            <a:off x="18006231" y="2999416"/>
+            <a:ext cx="1411161" cy="276999"/>
+          </a:xfrm>
+          <a:prstGeom prst="rect">
+            <a:avLst/>
+          </a:prstGeom>
+          <a:noFill/>
+        </p:spPr>
+        <p:txBody>
+          <a:bodyPr wrap="square" rtlCol="0">
+            <a:spAutoFit/>
+          </a:bodyPr>
+          <a:lstStyle/>
+          <a:p>
+            <a:pPr algn="ctr"/>
+            <a:r>
+              <a:rPr lang="en-US" sz="1200" b="1" dirty="0"/>
+              <a:t>Event Queue</a:t>
+            </a:r>
+          </a:p>
+        </p:txBody>
+      </p:sp>
+      <p:sp>
+        <p:nvSpPr>
+          <p:cNvPr id="105" name="Rectangle 104">
+            <a:extLst>
+              <a:ext uri="{FF2B5EF4-FFF2-40B4-BE49-F238E27FC236}">
+                <a16:creationId xmlns:a16="http://schemas.microsoft.com/office/drawing/2014/main" id="{B6A5E57B-1922-8544-9469-8DD2C5DA4CCF}"/>
+              </a:ext>
+            </a:extLst>
+          </p:cNvPr>
+          <p:cNvSpPr/>
+          <p:nvPr/>
+        </p:nvSpPr>
+        <p:spPr>
+          <a:xfrm>
+            <a:off x="18006233" y="2999416"/>
+            <a:ext cx="1411159" cy="276999"/>
+          </a:xfrm>
+          <a:prstGeom prst="rect">
+            <a:avLst/>
+          </a:prstGeom>
+          <a:noFill/>
+          <a:ln>
+            <a:solidFill>
+              <a:schemeClr val="tx1"/>
+            </a:solidFill>
+          </a:ln>
+        </p:spPr>
+        <p:style>
+          <a:lnRef idx="2">
+            <a:schemeClr val="accent1">
+              <a:shade val="50000"/>
+            </a:schemeClr>
+          </a:lnRef>
+          <a:fillRef idx="1">
+            <a:schemeClr val="accent1"/>
+          </a:fillRef>
+          <a:effectRef idx="0">
+            <a:schemeClr val="accent1"/>
+          </a:effectRef>
+          <a:fontRef idx="minor">
+            <a:schemeClr val="lt1"/>
+          </a:fontRef>
+        </p:style>
+        <p:txBody>
+          <a:bodyPr rtlCol="0" anchor="ctr"/>
+          <a:lstStyle/>
+          <a:p>
+            <a:pPr algn="ctr"/>
+            <a:endParaRPr lang="en-US"/>
+          </a:p>
+        </p:txBody>
+      </p:sp>
+      <p:cxnSp>
+        <p:nvCxnSpPr>
+          <p:cNvPr id="129" name="Straight Arrow Connector 128">
+            <a:extLst>
+              <a:ext uri="{FF2B5EF4-FFF2-40B4-BE49-F238E27FC236}">
+                <a16:creationId xmlns:a16="http://schemas.microsoft.com/office/drawing/2014/main" id="{F9EBFC5A-5A8E-5F47-B43C-BFE0E99C67C7}"/>
+              </a:ext>
+            </a:extLst>
+          </p:cNvPr>
+          <p:cNvCxnSpPr>
+            <a:cxnSpLocks/>
+            <a:stCxn id="105" idx="2"/>
+          </p:cNvCxnSpPr>
+          <p:nvPr/>
+        </p:nvCxnSpPr>
+        <p:spPr>
+          <a:xfrm rot="5400000" flipH="1">
+            <a:off x="17144528" y="1709131"/>
+            <a:ext cx="535988" cy="2598581"/>
+          </a:xfrm>
+          <a:prstGeom prst="bentConnector4">
+            <a:avLst>
+              <a:gd name="adj1" fmla="val -42650"/>
+              <a:gd name="adj2" fmla="val 89490"/>
+            </a:avLst>
+          </a:prstGeom>
+          <a:ln w="28575">
+            <a:solidFill>
+              <a:srgbClr val="FF0000"/>
+            </a:solidFill>
+            <a:headEnd type="triangle" w="med" len="med"/>
+            <a:tailEnd type="triangle" w="med" len="med"/>
+          </a:ln>
+        </p:spPr>
+        <p:style>
+          <a:lnRef idx="1">
+            <a:schemeClr val="accent1"/>
+          </a:lnRef>
+          <a:fillRef idx="0">
+            <a:schemeClr val="accent1"/>
+          </a:fillRef>
+          <a:effectRef idx="0">
+            <a:schemeClr val="accent1"/>
+          </a:effectRef>
+          <a:fontRef idx="minor">
+            <a:schemeClr val="tx1"/>
+          </a:fontRef>
+        </p:style>
+      </p:cxnSp>
+      <p:sp>
+        <p:nvSpPr>
+          <p:cNvPr id="140" name="TextBox 139">
+            <a:extLst>
+              <a:ext uri="{FF2B5EF4-FFF2-40B4-BE49-F238E27FC236}">
+                <a16:creationId xmlns:a16="http://schemas.microsoft.com/office/drawing/2014/main" id="{335C34DA-7A1A-BC42-BA2B-A72E24B7E6F5}"/>
+              </a:ext>
+            </a:extLst>
+          </p:cNvPr>
+          <p:cNvSpPr txBox="1"/>
+          <p:nvPr/>
+        </p:nvSpPr>
+        <p:spPr>
+          <a:xfrm>
+            <a:off x="16346093" y="3293132"/>
+            <a:ext cx="1787708" cy="215444"/>
+          </a:xfrm>
+          <a:prstGeom prst="rect">
+            <a:avLst/>
+          </a:prstGeom>
+          <a:noFill/>
+        </p:spPr>
+        <p:txBody>
+          <a:bodyPr wrap="square" rtlCol="0">
+            <a:spAutoFit/>
+          </a:bodyPr>
+          <a:lstStyle/>
+          <a:p>
+            <a:pPr algn="ctr"/>
+            <a:r>
+              <a:rPr lang="en-US" sz="800" dirty="0"/>
+              <a:t>Dequeue: </a:t>
+            </a:r>
+            <a:r>
+              <a:rPr lang="en-US" sz="800" b="1" dirty="0"/>
+              <a:t>DoRemainingWork</a:t>
+            </a:r>
+          </a:p>
+        </p:txBody>
+      </p:sp>
+      <p:sp>
+        <p:nvSpPr>
+          <p:cNvPr id="143" name="Rectangle 142">
+            <a:extLst>
+              <a:ext uri="{FF2B5EF4-FFF2-40B4-BE49-F238E27FC236}">
+                <a16:creationId xmlns:a16="http://schemas.microsoft.com/office/drawing/2014/main" id="{6783A7BB-4963-624E-B313-CAF001CCBE96}"/>
+              </a:ext>
+            </a:extLst>
+          </p:cNvPr>
+          <p:cNvSpPr/>
+          <p:nvPr/>
+        </p:nvSpPr>
+        <p:spPr>
+          <a:xfrm>
+            <a:off x="14485455" y="5117822"/>
+            <a:ext cx="1066322" cy="698446"/>
+          </a:xfrm>
+          <a:prstGeom prst="rect">
+            <a:avLst/>
+          </a:prstGeom>
+          <a:noFill/>
+          <a:ln>
+            <a:solidFill>
+              <a:schemeClr val="tx1"/>
+            </a:solidFill>
+          </a:ln>
+        </p:spPr>
+        <p:style>
+          <a:lnRef idx="2">
+            <a:schemeClr val="accent1">
+              <a:shade val="50000"/>
+            </a:schemeClr>
+          </a:lnRef>
+          <a:fillRef idx="1">
+            <a:schemeClr val="accent1"/>
+          </a:fillRef>
+          <a:effectRef idx="0">
+            <a:schemeClr val="accent1"/>
+          </a:effectRef>
+          <a:fontRef idx="minor">
+            <a:schemeClr val="lt1"/>
+          </a:fontRef>
+        </p:style>
+        <p:txBody>
+          <a:bodyPr rtlCol="0" anchor="ctr"/>
+          <a:lstStyle/>
+          <a:p>
+            <a:pPr algn="ctr"/>
+            <a:endParaRPr lang="en-US"/>
+          </a:p>
+        </p:txBody>
+      </p:sp>
+      <p:sp>
+        <p:nvSpPr>
+          <p:cNvPr id="144" name="TextBox 143">
+            <a:extLst>
+              <a:ext uri="{FF2B5EF4-FFF2-40B4-BE49-F238E27FC236}">
+                <a16:creationId xmlns:a16="http://schemas.microsoft.com/office/drawing/2014/main" id="{D3ACF2D4-1F36-654D-A896-9E4A6EB6B7B6}"/>
+              </a:ext>
+            </a:extLst>
+          </p:cNvPr>
+          <p:cNvSpPr txBox="1"/>
+          <p:nvPr/>
+        </p:nvSpPr>
+        <p:spPr>
+          <a:xfrm>
+            <a:off x="14480795" y="5127645"/>
+            <a:ext cx="1066323" cy="646331"/>
+          </a:xfrm>
+          <a:prstGeom prst="rect">
+            <a:avLst/>
+          </a:prstGeom>
+          <a:noFill/>
+        </p:spPr>
+        <p:txBody>
+          <a:bodyPr wrap="square" rtlCol="0">
+            <a:spAutoFit/>
+          </a:bodyPr>
+          <a:lstStyle/>
+          <a:p>
+            <a:pPr algn="ctr"/>
+            <a:r>
+              <a:rPr lang="en-US" sz="1200" b="1" dirty="0"/>
+              <a:t>StateMachine</a:t>
+            </a:r>
+          </a:p>
+          <a:p>
+            <a:pPr algn="ctr"/>
+            <a:endParaRPr lang="en-US" sz="1200" b="1" dirty="0"/>
+          </a:p>
+          <a:p>
+            <a:r>
+              <a:rPr lang="en-US" sz="1200" dirty="0"/>
+              <a:t>transition()</a:t>
+            </a:r>
+          </a:p>
+        </p:txBody>
+      </p:sp>
+      <p:sp>
+        <p:nvSpPr>
+          <p:cNvPr id="146" name="TextBox 145">
+            <a:extLst>
+              <a:ext uri="{FF2B5EF4-FFF2-40B4-BE49-F238E27FC236}">
+                <a16:creationId xmlns:a16="http://schemas.microsoft.com/office/drawing/2014/main" id="{8CB24272-60B8-584C-9968-BC00BDBF76A5}"/>
+              </a:ext>
+            </a:extLst>
+          </p:cNvPr>
+          <p:cNvSpPr txBox="1"/>
+          <p:nvPr/>
+        </p:nvSpPr>
+        <p:spPr>
+          <a:xfrm>
+            <a:off x="16571956" y="5048796"/>
+            <a:ext cx="1434275" cy="830997"/>
+          </a:xfrm>
+          <a:prstGeom prst="rect">
+            <a:avLst/>
+          </a:prstGeom>
+          <a:noFill/>
+          <a:ln w="6350">
+            <a:solidFill>
+              <a:schemeClr val="tx1"/>
+            </a:solidFill>
+          </a:ln>
+        </p:spPr>
+        <p:txBody>
+          <a:bodyPr wrap="square" rtlCol="0">
+            <a:spAutoFit/>
+          </a:bodyPr>
+          <a:lstStyle/>
+          <a:p>
+            <a:pPr algn="ctr"/>
+            <a:r>
+              <a:rPr lang="en-US" sz="1200" b="1" dirty="0"/>
+              <a:t>TopLevelTransition</a:t>
+            </a:r>
+          </a:p>
+          <a:p>
+            <a:pPr algn="ctr"/>
+            <a:endParaRPr lang="en-US" sz="1200" b="1" dirty="0"/>
+          </a:p>
+          <a:p>
+            <a:r>
+              <a:rPr lang="en-US" sz="1200" dirty="0"/>
+              <a:t>transition()</a:t>
+            </a:r>
+          </a:p>
+          <a:p>
+            <a:r>
+              <a:rPr lang="en-US" sz="1200" dirty="0"/>
+              <a:t>suspendTransition()</a:t>
+            </a:r>
+          </a:p>
+        </p:txBody>
+      </p:sp>
+      <p:sp>
+        <p:nvSpPr>
+          <p:cNvPr id="180" name="Rectangle 179">
+            <a:extLst>
+              <a:ext uri="{FF2B5EF4-FFF2-40B4-BE49-F238E27FC236}">
+                <a16:creationId xmlns:a16="http://schemas.microsoft.com/office/drawing/2014/main" id="{E195B45E-9933-544F-B0E5-8AE9B35A5A2C}"/>
+              </a:ext>
+            </a:extLst>
+          </p:cNvPr>
+          <p:cNvSpPr/>
+          <p:nvPr/>
+        </p:nvSpPr>
+        <p:spPr>
+          <a:xfrm>
+            <a:off x="19390254" y="4046278"/>
+            <a:ext cx="2072203" cy="840819"/>
+          </a:xfrm>
+          <a:prstGeom prst="rect">
+            <a:avLst/>
+          </a:prstGeom>
+          <a:noFill/>
+          <a:ln>
+            <a:solidFill>
+              <a:schemeClr val="tx1"/>
+            </a:solidFill>
+          </a:ln>
+        </p:spPr>
+        <p:style>
+          <a:lnRef idx="2">
+            <a:schemeClr val="accent1">
+              <a:shade val="50000"/>
+            </a:schemeClr>
+          </a:lnRef>
+          <a:fillRef idx="1">
+            <a:schemeClr val="accent1"/>
+          </a:fillRef>
+          <a:effectRef idx="0">
+            <a:schemeClr val="accent1"/>
+          </a:effectRef>
+          <a:fontRef idx="minor">
+            <a:schemeClr val="lt1"/>
+          </a:fontRef>
+        </p:style>
+        <p:txBody>
+          <a:bodyPr rtlCol="0" anchor="ctr"/>
+          <a:lstStyle/>
+          <a:p>
+            <a:pPr algn="ctr"/>
+            <a:endParaRPr lang="en-US"/>
+          </a:p>
+        </p:txBody>
+      </p:sp>
+      <p:sp>
+        <p:nvSpPr>
+          <p:cNvPr id="181" name="TextBox 180">
+            <a:extLst>
+              <a:ext uri="{FF2B5EF4-FFF2-40B4-BE49-F238E27FC236}">
+                <a16:creationId xmlns:a16="http://schemas.microsoft.com/office/drawing/2014/main" id="{9320AB9A-F82D-AD4B-9235-644736299C07}"/>
+              </a:ext>
+            </a:extLst>
+          </p:cNvPr>
+          <p:cNvSpPr txBox="1"/>
+          <p:nvPr/>
+        </p:nvSpPr>
+        <p:spPr>
+          <a:xfrm>
+            <a:off x="19385594" y="4056100"/>
+            <a:ext cx="2076863" cy="830997"/>
+          </a:xfrm>
+          <a:prstGeom prst="rect">
+            <a:avLst/>
+          </a:prstGeom>
+          <a:noFill/>
+        </p:spPr>
+        <p:txBody>
+          <a:bodyPr wrap="square" rtlCol="0">
+            <a:spAutoFit/>
+          </a:bodyPr>
+          <a:lstStyle/>
+          <a:p>
+            <a:pPr algn="ctr"/>
+            <a:r>
+              <a:rPr lang="en-US" sz="1200" b="1" dirty="0"/>
+              <a:t>DoRemainingWorkTransition</a:t>
+            </a:r>
+          </a:p>
+          <a:p>
+            <a:pPr algn="ctr"/>
+            <a:endParaRPr lang="en-US" sz="1200" b="1" dirty="0"/>
+          </a:p>
+          <a:p>
+            <a:r>
+              <a:rPr lang="en-US" sz="1200" dirty="0"/>
+              <a:t>transition()</a:t>
+            </a:r>
+          </a:p>
+          <a:p>
+            <a:r>
+              <a:rPr lang="en-US" sz="1200" dirty="0"/>
+              <a:t>cleanTransition()</a:t>
+            </a:r>
+          </a:p>
+        </p:txBody>
+      </p:sp>
+      <p:sp>
+        <p:nvSpPr>
+          <p:cNvPr id="185" name="TextBox 184">
+            <a:extLst>
+              <a:ext uri="{FF2B5EF4-FFF2-40B4-BE49-F238E27FC236}">
+                <a16:creationId xmlns:a16="http://schemas.microsoft.com/office/drawing/2014/main" id="{65B96109-7CE7-7049-A23C-8B59507944FA}"/>
+              </a:ext>
+            </a:extLst>
+          </p:cNvPr>
+          <p:cNvSpPr txBox="1"/>
+          <p:nvPr/>
+        </p:nvSpPr>
+        <p:spPr>
+          <a:xfrm rot="20118368">
+            <a:off x="17697397" y="4733415"/>
+            <a:ext cx="1787708" cy="215444"/>
+          </a:xfrm>
+          <a:prstGeom prst="rect">
+            <a:avLst/>
+          </a:prstGeom>
+          <a:noFill/>
+        </p:spPr>
+        <p:txBody>
+          <a:bodyPr wrap="square" rtlCol="0">
+            <a:spAutoFit/>
+          </a:bodyPr>
+          <a:lstStyle/>
+          <a:p>
+            <a:pPr algn="ctr"/>
+            <a:r>
+              <a:rPr lang="en-US" sz="800" dirty="0"/>
+              <a:t>When </a:t>
+            </a:r>
+            <a:r>
+              <a:rPr lang="en-US" sz="800" b="1" dirty="0"/>
+              <a:t>DoRemainingWork</a:t>
+            </a:r>
+          </a:p>
+        </p:txBody>
+      </p:sp>
+      <p:sp>
+        <p:nvSpPr>
+          <p:cNvPr id="189" name="TextBox 188">
+            <a:extLst>
+              <a:ext uri="{FF2B5EF4-FFF2-40B4-BE49-F238E27FC236}">
+                <a16:creationId xmlns:a16="http://schemas.microsoft.com/office/drawing/2014/main" id="{F434C336-9DBB-C34D-ADDE-61C7458090D5}"/>
+              </a:ext>
+            </a:extLst>
+          </p:cNvPr>
+          <p:cNvSpPr txBox="1"/>
+          <p:nvPr/>
+        </p:nvSpPr>
+        <p:spPr>
+          <a:xfrm>
+            <a:off x="21989210" y="3508576"/>
+            <a:ext cx="2072203" cy="1015663"/>
+          </a:xfrm>
+          <a:prstGeom prst="rect">
+            <a:avLst/>
+          </a:prstGeom>
+          <a:noFill/>
+          <a:ln w="6350">
+            <a:solidFill>
+              <a:schemeClr val="tx1"/>
+            </a:solidFill>
+          </a:ln>
+        </p:spPr>
+        <p:txBody>
+          <a:bodyPr wrap="square" rtlCol="0">
+            <a:spAutoFit/>
+          </a:bodyPr>
+          <a:lstStyle/>
+          <a:p>
+            <a:pPr algn="ctr"/>
+            <a:r>
+              <a:rPr lang="en-US" sz="1200" b="1" dirty="0"/>
+              <a:t>StartedFlowTransition</a:t>
+            </a:r>
+          </a:p>
+          <a:p>
+            <a:pPr algn="ctr"/>
+            <a:endParaRPr lang="en-US" sz="1200" b="1" dirty="0"/>
+          </a:p>
+          <a:p>
+            <a:r>
+              <a:rPr lang="en-US" sz="1200" dirty="0"/>
+              <a:t>transition()</a:t>
+            </a:r>
+          </a:p>
+          <a:p>
+            <a:r>
+              <a:rPr lang="en-US" sz="1200" dirty="0"/>
+              <a:t>receiveTransition()</a:t>
+            </a:r>
+          </a:p>
+          <a:p>
+            <a:r>
+              <a:rPr lang="en-US" sz="1200" dirty="0"/>
+              <a:t>sendTransition()</a:t>
+            </a:r>
+          </a:p>
+        </p:txBody>
+      </p:sp>
+      <p:cxnSp>
+        <p:nvCxnSpPr>
+          <p:cNvPr id="266" name="Straight Arrow Connector 265">
+            <a:extLst>
+              <a:ext uri="{FF2B5EF4-FFF2-40B4-BE49-F238E27FC236}">
+                <a16:creationId xmlns:a16="http://schemas.microsoft.com/office/drawing/2014/main" id="{26498E20-DECF-5D46-8185-B520023716F4}"/>
+              </a:ext>
+            </a:extLst>
+          </p:cNvPr>
+          <p:cNvCxnSpPr>
+            <a:cxnSpLocks/>
+          </p:cNvCxnSpPr>
+          <p:nvPr/>
+        </p:nvCxnSpPr>
+        <p:spPr>
+          <a:xfrm rot="10800000" flipV="1">
+            <a:off x="14822107" y="2800429"/>
+            <a:ext cx="383698" cy="164181"/>
+          </a:xfrm>
+          <a:prstGeom prst="bentConnector3">
+            <a:avLst>
+              <a:gd name="adj1" fmla="val -490"/>
+            </a:avLst>
+          </a:prstGeom>
+          <a:ln w="28575">
+            <a:solidFill>
+              <a:srgbClr val="FF0000"/>
+            </a:solidFill>
+            <a:headEnd type="none" w="med" len="med"/>
+            <a:tailEnd type="triangle" w="med" len="med"/>
+          </a:ln>
+        </p:spPr>
+        <p:style>
+          <a:lnRef idx="1">
+            <a:schemeClr val="accent1"/>
+          </a:lnRef>
+          <a:fillRef idx="0">
+            <a:schemeClr val="accent1"/>
+          </a:fillRef>
+          <a:effectRef idx="0">
+            <a:schemeClr val="accent1"/>
+          </a:effectRef>
+          <a:fontRef idx="minor">
+            <a:schemeClr val="tx1"/>
+          </a:fontRef>
+        </p:style>
+      </p:cxnSp>
+      <p:cxnSp>
+        <p:nvCxnSpPr>
+          <p:cNvPr id="290" name="Straight Arrow Connector 289">
+            <a:extLst>
+              <a:ext uri="{FF2B5EF4-FFF2-40B4-BE49-F238E27FC236}">
+                <a16:creationId xmlns:a16="http://schemas.microsoft.com/office/drawing/2014/main" id="{043876B0-7BE2-D74B-992E-8ABB2EA9A0AC}"/>
+              </a:ext>
+            </a:extLst>
+          </p:cNvPr>
+          <p:cNvCxnSpPr>
+            <a:cxnSpLocks/>
+          </p:cNvCxnSpPr>
+          <p:nvPr/>
+        </p:nvCxnSpPr>
+        <p:spPr>
+          <a:xfrm>
+            <a:off x="13985482" y="2987741"/>
+            <a:ext cx="559110" cy="2625420"/>
+          </a:xfrm>
+          <a:prstGeom prst="straightConnector1">
+            <a:avLst/>
+          </a:prstGeom>
+          <a:ln w="28575">
+            <a:solidFill>
+              <a:srgbClr val="FF0000"/>
+            </a:solidFill>
+            <a:headEnd type="none" w="med" len="med"/>
+            <a:tailEnd type="triangle" w="med" len="med"/>
+          </a:ln>
+        </p:spPr>
+        <p:style>
+          <a:lnRef idx="1">
+            <a:schemeClr val="accent1"/>
+          </a:lnRef>
+          <a:fillRef idx="0">
+            <a:schemeClr val="accent1"/>
+          </a:fillRef>
+          <a:effectRef idx="0">
+            <a:schemeClr val="accent1"/>
+          </a:effectRef>
+          <a:fontRef idx="minor">
+            <a:schemeClr val="tx1"/>
+          </a:fontRef>
+        </p:style>
+      </p:cxnSp>
+      <p:cxnSp>
+        <p:nvCxnSpPr>
+          <p:cNvPr id="291" name="Straight Arrow Connector 290">
+            <a:extLst>
+              <a:ext uri="{FF2B5EF4-FFF2-40B4-BE49-F238E27FC236}">
+                <a16:creationId xmlns:a16="http://schemas.microsoft.com/office/drawing/2014/main" id="{3ADBD2F8-DE11-374A-8E47-66F4B13629AD}"/>
+              </a:ext>
+            </a:extLst>
+          </p:cNvPr>
+          <p:cNvCxnSpPr>
+            <a:cxnSpLocks/>
+            <a:endCxn id="146" idx="1"/>
+          </p:cNvCxnSpPr>
+          <p:nvPr/>
+        </p:nvCxnSpPr>
+        <p:spPr>
+          <a:xfrm flipV="1">
+            <a:off x="15288344" y="5464295"/>
+            <a:ext cx="1283612" cy="132576"/>
+          </a:xfrm>
+          <a:prstGeom prst="straightConnector1">
+            <a:avLst/>
+          </a:prstGeom>
+          <a:ln w="28575">
+            <a:solidFill>
+              <a:srgbClr val="FF0000"/>
+            </a:solidFill>
+            <a:headEnd type="none" w="med" len="med"/>
+            <a:tailEnd type="triangle" w="med" len="med"/>
+          </a:ln>
+        </p:spPr>
+        <p:style>
+          <a:lnRef idx="1">
+            <a:schemeClr val="accent1"/>
+          </a:lnRef>
+          <a:fillRef idx="0">
+            <a:schemeClr val="accent1"/>
+          </a:fillRef>
+          <a:effectRef idx="0">
+            <a:schemeClr val="accent1"/>
+          </a:effectRef>
+          <a:fontRef idx="minor">
+            <a:schemeClr val="tx1"/>
+          </a:fontRef>
+        </p:style>
+      </p:cxnSp>
+      <p:cxnSp>
+        <p:nvCxnSpPr>
+          <p:cNvPr id="292" name="Straight Arrow Connector 291">
+            <a:extLst>
+              <a:ext uri="{FF2B5EF4-FFF2-40B4-BE49-F238E27FC236}">
+                <a16:creationId xmlns:a16="http://schemas.microsoft.com/office/drawing/2014/main" id="{98F99F63-FAE8-2346-BF50-CA9DD3FC28A3}"/>
+              </a:ext>
+            </a:extLst>
+          </p:cNvPr>
+          <p:cNvCxnSpPr>
+            <a:cxnSpLocks/>
+          </p:cNvCxnSpPr>
+          <p:nvPr/>
+        </p:nvCxnSpPr>
+        <p:spPr>
+          <a:xfrm flipV="1">
+            <a:off x="17364722" y="4562632"/>
+            <a:ext cx="1988728" cy="977034"/>
+          </a:xfrm>
+          <a:prstGeom prst="straightConnector1">
+            <a:avLst/>
+          </a:prstGeom>
+          <a:ln w="28575">
+            <a:solidFill>
+              <a:srgbClr val="FF0000"/>
+            </a:solidFill>
+            <a:headEnd type="none" w="med" len="med"/>
+            <a:tailEnd type="triangle" w="med" len="med"/>
+          </a:ln>
+        </p:spPr>
+        <p:style>
+          <a:lnRef idx="1">
+            <a:schemeClr val="accent1"/>
+          </a:lnRef>
+          <a:fillRef idx="0">
+            <a:schemeClr val="accent1"/>
+          </a:fillRef>
+          <a:effectRef idx="0">
+            <a:schemeClr val="accent1"/>
+          </a:effectRef>
+          <a:fontRef idx="minor">
+            <a:schemeClr val="tx1"/>
+          </a:fontRef>
+        </p:style>
+      </p:cxnSp>
+      <p:cxnSp>
+        <p:nvCxnSpPr>
+          <p:cNvPr id="298" name="Straight Arrow Connector 265">
+            <a:extLst>
+              <a:ext uri="{FF2B5EF4-FFF2-40B4-BE49-F238E27FC236}">
+                <a16:creationId xmlns:a16="http://schemas.microsoft.com/office/drawing/2014/main" id="{F4A7DA0E-AC3E-FC46-8BD5-0AD40EE9AA4C}"/>
+              </a:ext>
+            </a:extLst>
+          </p:cNvPr>
+          <p:cNvCxnSpPr>
+            <a:cxnSpLocks/>
+          </p:cNvCxnSpPr>
+          <p:nvPr/>
+        </p:nvCxnSpPr>
+        <p:spPr>
+          <a:xfrm>
+            <a:off x="20187053" y="4524239"/>
+            <a:ext cx="263184" cy="166040"/>
+          </a:xfrm>
+          <a:prstGeom prst="bentConnector3">
+            <a:avLst>
+              <a:gd name="adj1" fmla="val 98480"/>
+            </a:avLst>
+          </a:prstGeom>
+          <a:ln w="28575">
+            <a:solidFill>
+              <a:srgbClr val="FF0000"/>
+            </a:solidFill>
+            <a:tailEnd type="triangle"/>
+          </a:ln>
+        </p:spPr>
+        <p:style>
+          <a:lnRef idx="1">
+            <a:schemeClr val="accent1"/>
+          </a:lnRef>
+          <a:fillRef idx="0">
+            <a:schemeClr val="accent1"/>
+          </a:fillRef>
+          <a:effectRef idx="0">
+            <a:schemeClr val="accent1"/>
+          </a:effectRef>
+          <a:fontRef idx="minor">
+            <a:schemeClr val="tx1"/>
+          </a:fontRef>
+        </p:style>
+      </p:cxnSp>
+      <p:cxnSp>
+        <p:nvCxnSpPr>
+          <p:cNvPr id="316" name="Straight Arrow Connector 315">
+            <a:extLst>
+              <a:ext uri="{FF2B5EF4-FFF2-40B4-BE49-F238E27FC236}">
+                <a16:creationId xmlns:a16="http://schemas.microsoft.com/office/drawing/2014/main" id="{F4FB71F4-22E4-9346-B72F-95F6C9B85DF9}"/>
+              </a:ext>
+            </a:extLst>
+          </p:cNvPr>
+          <p:cNvCxnSpPr>
+            <a:cxnSpLocks/>
+          </p:cNvCxnSpPr>
+          <p:nvPr/>
+        </p:nvCxnSpPr>
+        <p:spPr>
+          <a:xfrm flipV="1">
+            <a:off x="20545155" y="3985244"/>
+            <a:ext cx="1499104" cy="739178"/>
+          </a:xfrm>
+          <a:prstGeom prst="straightConnector1">
+            <a:avLst/>
+          </a:prstGeom>
+          <a:ln w="28575">
+            <a:solidFill>
+              <a:srgbClr val="FF0000"/>
+            </a:solidFill>
+            <a:headEnd type="none" w="med" len="med"/>
+            <a:tailEnd type="triangle" w="med" len="med"/>
+          </a:ln>
+        </p:spPr>
+        <p:style>
+          <a:lnRef idx="1">
+            <a:schemeClr val="accent1"/>
+          </a:lnRef>
+          <a:fillRef idx="0">
+            <a:schemeClr val="accent1"/>
+          </a:fillRef>
+          <a:effectRef idx="0">
+            <a:schemeClr val="accent1"/>
+          </a:effectRef>
+          <a:fontRef idx="minor">
+            <a:schemeClr val="tx1"/>
+          </a:fontRef>
+        </p:style>
+      </p:cxnSp>
+      <p:sp>
+        <p:nvSpPr>
+          <p:cNvPr id="321" name="U-turn Arrow 320">
+            <a:extLst>
+              <a:ext uri="{FF2B5EF4-FFF2-40B4-BE49-F238E27FC236}">
+                <a16:creationId xmlns:a16="http://schemas.microsoft.com/office/drawing/2014/main" id="{5805E2E1-451D-CE46-BF8C-C9BA5AA878A2}"/>
+              </a:ext>
+            </a:extLst>
+          </p:cNvPr>
+          <p:cNvSpPr/>
+          <p:nvPr/>
+        </p:nvSpPr>
+        <p:spPr>
+          <a:xfrm rot="5400000">
+            <a:off x="23072058" y="3761715"/>
+            <a:ext cx="389465" cy="903542"/>
+          </a:xfrm>
+          <a:prstGeom prst="uturnArrow">
+            <a:avLst>
+              <a:gd name="adj1" fmla="val 0"/>
+              <a:gd name="adj2" fmla="val 6434"/>
+              <a:gd name="adj3" fmla="val 8568"/>
+              <a:gd name="adj4" fmla="val 0"/>
+              <a:gd name="adj5" fmla="val 63582"/>
+            </a:avLst>
+          </a:prstGeom>
+          <a:solidFill>
+            <a:schemeClr val="accent1"/>
+          </a:solidFill>
+          <a:ln w="28575">
+            <a:solidFill>
+              <a:srgbClr val="FF0000"/>
+            </a:solidFill>
+          </a:ln>
+        </p:spPr>
+        <p:style>
+          <a:lnRef idx="2">
+            <a:schemeClr val="accent1">
+              <a:shade val="50000"/>
+            </a:schemeClr>
+          </a:lnRef>
+          <a:fillRef idx="1">
+            <a:schemeClr val="accent1"/>
+          </a:fillRef>
+          <a:effectRef idx="0">
+            <a:schemeClr val="accent1"/>
+          </a:effectRef>
+          <a:fontRef idx="minor">
+            <a:schemeClr val="lt1"/>
+          </a:fontRef>
+        </p:style>
+        <p:txBody>
+          <a:bodyPr rtlCol="0" anchor="ctr"/>
+          <a:lstStyle/>
+          <a:p>
+            <a:pPr algn="ctr"/>
+            <a:endParaRPr lang="en-US">
+              <a:solidFill>
+                <a:schemeClr val="tx1"/>
+              </a:solidFill>
+            </a:endParaRPr>
+          </a:p>
+        </p:txBody>
+      </p:sp>
+      <p:sp>
+        <p:nvSpPr>
+          <p:cNvPr id="166" name="TextBox 165">
+            <a:extLst>
+              <a:ext uri="{FF2B5EF4-FFF2-40B4-BE49-F238E27FC236}">
+                <a16:creationId xmlns:a16="http://schemas.microsoft.com/office/drawing/2014/main" id="{0F3C666C-EBA7-C640-9D8C-4E69FC748CFC}"/>
+              </a:ext>
+            </a:extLst>
+          </p:cNvPr>
+          <p:cNvSpPr txBox="1"/>
+          <p:nvPr/>
+        </p:nvSpPr>
+        <p:spPr>
+          <a:xfrm>
+            <a:off x="18126836" y="3363685"/>
+            <a:ext cx="232250" cy="276999"/>
+          </a:xfrm>
+          <a:prstGeom prst="rect">
+            <a:avLst/>
+          </a:prstGeom>
+          <a:solidFill>
+            <a:schemeClr val="bg1"/>
+          </a:solidFill>
+          <a:ln w="38100">
+            <a:solidFill>
+              <a:srgbClr val="FF0000"/>
+            </a:solidFill>
+          </a:ln>
+        </p:spPr>
+        <p:txBody>
+          <a:bodyPr wrap="square" rtlCol="0">
+            <a:spAutoFit/>
+          </a:bodyPr>
+          <a:lstStyle/>
+          <a:p>
+            <a:r>
+              <a:rPr lang="en-US" sz="1200" b="1" dirty="0">
+                <a:solidFill>
+                  <a:srgbClr val="FF0000"/>
+                </a:solidFill>
+              </a:rPr>
+              <a:t>1</a:t>
+            </a:r>
+          </a:p>
+        </p:txBody>
+      </p:sp>
+      <p:sp>
+        <p:nvSpPr>
+          <p:cNvPr id="167" name="TextBox 166">
+            <a:extLst>
+              <a:ext uri="{FF2B5EF4-FFF2-40B4-BE49-F238E27FC236}">
+                <a16:creationId xmlns:a16="http://schemas.microsoft.com/office/drawing/2014/main" id="{D85929F8-DE20-9141-9FEE-C618F2E5DDE5}"/>
+              </a:ext>
+            </a:extLst>
+          </p:cNvPr>
+          <p:cNvSpPr txBox="1"/>
+          <p:nvPr/>
+        </p:nvSpPr>
+        <p:spPr>
+          <a:xfrm>
+            <a:off x="14165932" y="4123822"/>
+            <a:ext cx="232250" cy="276999"/>
+          </a:xfrm>
+          <a:prstGeom prst="rect">
+            <a:avLst/>
+          </a:prstGeom>
+          <a:solidFill>
+            <a:schemeClr val="bg1"/>
+          </a:solidFill>
+          <a:ln w="38100">
+            <a:solidFill>
+              <a:srgbClr val="FF0000"/>
+            </a:solidFill>
+          </a:ln>
+        </p:spPr>
+        <p:txBody>
+          <a:bodyPr wrap="square" rtlCol="0">
+            <a:spAutoFit/>
+          </a:bodyPr>
+          <a:lstStyle/>
+          <a:p>
+            <a:r>
+              <a:rPr lang="en-US" sz="1200" b="1" dirty="0">
+                <a:solidFill>
+                  <a:srgbClr val="FF0000"/>
+                </a:solidFill>
+              </a:rPr>
+              <a:t>3</a:t>
+            </a:r>
+          </a:p>
+        </p:txBody>
+      </p:sp>
+      <p:sp>
+        <p:nvSpPr>
+          <p:cNvPr id="168" name="TextBox 167">
+            <a:extLst>
+              <a:ext uri="{FF2B5EF4-FFF2-40B4-BE49-F238E27FC236}">
+                <a16:creationId xmlns:a16="http://schemas.microsoft.com/office/drawing/2014/main" id="{97C84D8E-D2C7-A04A-BF35-0325C4DBFD08}"/>
+              </a:ext>
+            </a:extLst>
+          </p:cNvPr>
+          <p:cNvSpPr txBox="1"/>
+          <p:nvPr/>
+        </p:nvSpPr>
+        <p:spPr>
+          <a:xfrm>
+            <a:off x="23372189" y="4189688"/>
+            <a:ext cx="232250" cy="276999"/>
+          </a:xfrm>
+          <a:prstGeom prst="rect">
+            <a:avLst/>
+          </a:prstGeom>
+          <a:solidFill>
+            <a:schemeClr val="bg1"/>
+          </a:solidFill>
+          <a:ln w="38100">
+            <a:solidFill>
+              <a:srgbClr val="FF0000"/>
+            </a:solidFill>
+          </a:ln>
+        </p:spPr>
+        <p:txBody>
+          <a:bodyPr wrap="square" rtlCol="0">
+            <a:spAutoFit/>
+          </a:bodyPr>
+          <a:lstStyle/>
+          <a:p>
+            <a:r>
+              <a:rPr lang="en-US" sz="1200" b="1" dirty="0">
+                <a:solidFill>
+                  <a:srgbClr val="FF0000"/>
+                </a:solidFill>
+              </a:rPr>
+              <a:t>4</a:t>
+            </a:r>
+          </a:p>
+        </p:txBody>
+      </p:sp>
+      <p:sp>
+        <p:nvSpPr>
+          <p:cNvPr id="176" name="TextBox 175">
+            <a:extLst>
+              <a:ext uri="{FF2B5EF4-FFF2-40B4-BE49-F238E27FC236}">
+                <a16:creationId xmlns:a16="http://schemas.microsoft.com/office/drawing/2014/main" id="{BF4EE261-2E65-7A44-A19F-BFCB6B83F347}"/>
+              </a:ext>
+            </a:extLst>
+          </p:cNvPr>
+          <p:cNvSpPr txBox="1"/>
+          <p:nvPr/>
+        </p:nvSpPr>
+        <p:spPr>
+          <a:xfrm>
+            <a:off x="15091866" y="2892702"/>
+            <a:ext cx="232250" cy="276999"/>
+          </a:xfrm>
+          <a:prstGeom prst="rect">
+            <a:avLst/>
+          </a:prstGeom>
+          <a:solidFill>
+            <a:schemeClr val="bg1"/>
+          </a:solidFill>
+          <a:ln w="38100">
+            <a:solidFill>
+              <a:srgbClr val="FF0000"/>
+            </a:solidFill>
+          </a:ln>
+        </p:spPr>
+        <p:txBody>
+          <a:bodyPr wrap="square" rtlCol="0">
+            <a:spAutoFit/>
+          </a:bodyPr>
+          <a:lstStyle/>
+          <a:p>
+            <a:r>
+              <a:rPr lang="en-US" sz="1200" b="1" dirty="0">
+                <a:solidFill>
+                  <a:srgbClr val="FF0000"/>
+                </a:solidFill>
+              </a:rPr>
+              <a:t>2</a:t>
+            </a:r>
+          </a:p>
+        </p:txBody>
+      </p:sp>
+    </p:spTree>
+    <p:extLst>
+      <p:ext uri="{BB962C8B-B14F-4D97-AF65-F5344CB8AC3E}">
+        <p14:creationId xmlns:p14="http://schemas.microsoft.com/office/powerpoint/2010/main" val="151098243"/>
+      </p:ext>
+    </p:extLst>
+  </p:cSld>
+  <p:clrMapOvr>
+    <a:masterClrMapping/>
+  </p:clrMapOvr>
+</p:sld>
+</file>
+
+<file path=ppt/slides/slide5.xml><?xml version="1.0" encoding="utf-8"?>
+<p:sld xmlns:a="http://schemas.openxmlformats.org/drawingml/2006/main" xmlns:r="http://schemas.openxmlformats.org/officeDocument/2006/relationships" xmlns:p="http://schemas.openxmlformats.org/presentationml/2006/main">
+  <p:cSld>
+    <p:spTree>
+      <p:nvGrpSpPr>
+        <p:cNvPr id="1" name=""/>
+        <p:cNvGrpSpPr/>
+        <p:nvPr/>
+      </p:nvGrpSpPr>
+      <p:grpSpPr>
+        <a:xfrm>
+          <a:off x="0" y="0"/>
+          <a:ext cx="0" cy="0"/>
+          <a:chOff x="0" y="0"/>
+          <a:chExt cx="0" cy="0"/>
+        </a:xfrm>
+      </p:grpSpPr>
+      <p:sp>
+        <p:nvSpPr>
+          <p:cNvPr id="335" name="U-turn Arrow 334">
+            <a:extLst>
+              <a:ext uri="{FF2B5EF4-FFF2-40B4-BE49-F238E27FC236}">
+                <a16:creationId xmlns:a16="http://schemas.microsoft.com/office/drawing/2014/main" id="{EB324753-8FF7-094D-968D-570D5BF72370}"/>
+              </a:ext>
+            </a:extLst>
+          </p:cNvPr>
+          <p:cNvSpPr/>
+          <p:nvPr/>
+        </p:nvSpPr>
+        <p:spPr>
+          <a:xfrm rot="16200000" flipH="1">
             <a:off x="13385483" y="2384049"/>
             <a:ext cx="354637" cy="406520"/>
           </a:xfrm>
@@ -17551,7 +20371,7 @@
 </p:sld>
 </file>
 
-<file path=ppt/slides/slide5.xml><?xml version="1.0" encoding="utf-8"?>
+<file path=ppt/slides/slide6.xml><?xml version="1.0" encoding="utf-8"?>
 <p:sld xmlns:a="http://schemas.openxmlformats.org/drawingml/2006/main" xmlns:r="http://schemas.openxmlformats.org/officeDocument/2006/relationships" xmlns:p="http://schemas.openxmlformats.org/presentationml/2006/main">
   <p:cSld>
     <p:spTree>

</xml_diff>